<commit_message>
Feat: made slide for global objects and started on singleton pattern slide
</commit_message>
<xml_diff>
--- a/Beautiful C++ ch3-2 I.3.pptx
+++ b/Beautiful C++ ch3-2 I.3.pptx
@@ -5,17 +5,18 @@
     <p:sldMasterId id="2147483648" r:id="rId4"/>
   </p:sldMasterIdLst>
   <p:notesMasterIdLst>
-    <p:notesMasterId r:id="rId10"/>
+    <p:notesMasterId r:id="rId11"/>
   </p:notesMasterIdLst>
   <p:handoutMasterIdLst>
-    <p:handoutMasterId r:id="rId11"/>
+    <p:handoutMasterId r:id="rId12"/>
   </p:handoutMasterIdLst>
   <p:sldIdLst>
     <p:sldId id="256" r:id="rId5"/>
     <p:sldId id="289" r:id="rId6"/>
-    <p:sldId id="293" r:id="rId7"/>
-    <p:sldId id="288" r:id="rId8"/>
-    <p:sldId id="285" r:id="rId9"/>
+    <p:sldId id="294" r:id="rId7"/>
+    <p:sldId id="293" r:id="rId8"/>
+    <p:sldId id="288" r:id="rId9"/>
+    <p:sldId id="285" r:id="rId10"/>
   </p:sldIdLst>
   <p:sldSz cx="12192000" cy="6858000"/>
   <p:notesSz cx="6858000" cy="9144000"/>
@@ -218,7 +219,7 @@
           <a:p>
             <a:fld id="{762B48F5-BACC-47D6-A0F7-82FBF9C6BC85}" type="datetimeFigureOut">
               <a:rPr lang="en-US"/>
-              <a:t>3/6/2024</a:t>
+              <a:t>4/10/2024</a:t>
             </a:fld>
             <a:endParaRPr/>
           </a:p>
@@ -383,7 +384,7 @@
           <a:p>
             <a:fld id="{0CB1CD00-5424-4675-AB18-2C419B060449}" type="datetimeFigureOut">
               <a:rPr lang="en-US"/>
-              <a:t>3/6/2024</a:t>
+              <a:t>4/10/2024</a:t>
             </a:fld>
             <a:endParaRPr/>
           </a:p>
@@ -773,6 +774,10 @@
           <a:bodyPr/>
           <a:lstStyle/>
           <a:p>
+            <a:r>
+              <a:rPr lang="en-GB" dirty="0"/>
+              <a:t>Static -&gt; constructed at startup, destroyed at shutdown</a:t>
+            </a:r>
             <a:endParaRPr lang="en-BE" dirty="0"/>
           </a:p>
         </p:txBody>
@@ -794,7 +799,91 @@
           <a:p>
             <a:fld id="{5EE2CF44-2B13-41B4-A334-1CDF534EEBBF}" type="slidenum">
               <a:rPr lang="en-BE" smtClean="0"/>
-              <a:t>5</a:t>
+              <a:t>2</a:t>
+            </a:fld>
+            <a:endParaRPr lang="en-BE"/>
+          </a:p>
+        </p:txBody>
+      </p:sp>
+    </p:spTree>
+    <p:extLst>
+      <p:ext uri="{BB962C8B-B14F-4D97-AF65-F5344CB8AC3E}">
+        <p14:creationId xmlns:p14="http://schemas.microsoft.com/office/powerpoint/2010/main" val="2162419890"/>
+      </p:ext>
+    </p:extLst>
+  </p:cSld>
+  <p:clrMapOvr>
+    <a:masterClrMapping/>
+  </p:clrMapOvr>
+</p:notes>
+</file>
+
+<file path=ppt/notesSlides/notesSlide3.xml><?xml version="1.0" encoding="utf-8"?>
+<p:notes xmlns:a="http://schemas.openxmlformats.org/drawingml/2006/main" xmlns:r="http://schemas.openxmlformats.org/officeDocument/2006/relationships" xmlns:p="http://schemas.openxmlformats.org/presentationml/2006/main">
+  <p:cSld>
+    <p:spTree>
+      <p:nvGrpSpPr>
+        <p:cNvPr id="1" name=""/>
+        <p:cNvGrpSpPr/>
+        <p:nvPr/>
+      </p:nvGrpSpPr>
+      <p:grpSpPr>
+        <a:xfrm>
+          <a:off x="0" y="0"/>
+          <a:ext cx="0" cy="0"/>
+          <a:chOff x="0" y="0"/>
+          <a:chExt cx="0" cy="0"/>
+        </a:xfrm>
+      </p:grpSpPr>
+      <p:sp>
+        <p:nvSpPr>
+          <p:cNvPr id="2" name="Slide Image Placeholder 1"/>
+          <p:cNvSpPr>
+            <a:spLocks noGrp="1" noRot="1" noChangeAspect="1"/>
+          </p:cNvSpPr>
+          <p:nvPr>
+            <p:ph type="sldImg"/>
+          </p:nvPr>
+        </p:nvSpPr>
+        <p:spPr/>
+      </p:sp>
+      <p:sp>
+        <p:nvSpPr>
+          <p:cNvPr id="3" name="Notes Placeholder 2"/>
+          <p:cNvSpPr>
+            <a:spLocks noGrp="1"/>
+          </p:cNvSpPr>
+          <p:nvPr>
+            <p:ph type="body" idx="1"/>
+          </p:nvPr>
+        </p:nvSpPr>
+        <p:spPr/>
+        <p:txBody>
+          <a:bodyPr/>
+          <a:lstStyle/>
+          <a:p>
+            <a:endParaRPr lang="en-BE" dirty="0"/>
+          </a:p>
+        </p:txBody>
+      </p:sp>
+      <p:sp>
+        <p:nvSpPr>
+          <p:cNvPr id="4" name="Slide Number Placeholder 3"/>
+          <p:cNvSpPr>
+            <a:spLocks noGrp="1"/>
+          </p:cNvSpPr>
+          <p:nvPr>
+            <p:ph type="sldNum" sz="quarter" idx="5"/>
+          </p:nvPr>
+        </p:nvSpPr>
+        <p:spPr/>
+        <p:txBody>
+          <a:bodyPr/>
+          <a:lstStyle/>
+          <a:p>
+            <a:fld id="{5EE2CF44-2B13-41B4-A334-1CDF534EEBBF}" type="slidenum">
+              <a:rPr lang="en-BE" smtClean="0"/>
+              <a:t>6</a:t>
             </a:fld>
             <a:endParaRPr lang="en-BE"/>
           </a:p>
@@ -1196,7 +1285,7 @@
           <a:p>
             <a:fld id="{37CC0096-1860-4642-9CD2-0079EA5E7CD1}" type="datetimeFigureOut">
               <a:rPr lang="en-US" smtClean="0"/>
-              <a:t>3/6/2024</a:t>
+              <a:t>4/10/2024</a:t>
             </a:fld>
             <a:endParaRPr lang="en-US"/>
           </a:p>
@@ -1375,7 +1464,7 @@
           <a:p>
             <a:fld id="{37CC0096-1860-4642-9CD2-0079EA5E7CD1}" type="datetimeFigureOut">
               <a:rPr lang="en-US" smtClean="0"/>
-              <a:t>3/6/2024</a:t>
+              <a:t>4/10/2024</a:t>
             </a:fld>
             <a:endParaRPr lang="en-US"/>
           </a:p>
@@ -1548,7 +1637,7 @@
           <a:p>
             <a:fld id="{37CC0096-1860-4642-9CD2-0079EA5E7CD1}" type="datetimeFigureOut">
               <a:rPr lang="en-US" smtClean="0"/>
-              <a:t>3/6/2024</a:t>
+              <a:t>4/10/2024</a:t>
             </a:fld>
             <a:endParaRPr lang="en-US"/>
           </a:p>
@@ -1981,7 +2070,7 @@
           <a:p>
             <a:fld id="{37CC0096-1860-4642-9CD2-0079EA5E7CD1}" type="datetimeFigureOut">
               <a:rPr lang="en-US" smtClean="0"/>
-              <a:t>3/6/2024</a:t>
+              <a:t>4/10/2024</a:t>
             </a:fld>
             <a:endParaRPr lang="en-US"/>
           </a:p>
@@ -2420,7 +2509,7 @@
           <a:p>
             <a:fld id="{37CC0096-1860-4642-9CD2-0079EA5E7CD1}" type="datetimeFigureOut">
               <a:rPr lang="en-US" smtClean="0"/>
-              <a:t>3/6/2024</a:t>
+              <a:t>4/10/2024</a:t>
             </a:fld>
             <a:endParaRPr lang="en-US"/>
           </a:p>
@@ -2537,7 +2626,7 @@
           <a:p>
             <a:fld id="{37CC0096-1860-4642-9CD2-0079EA5E7CD1}" type="datetimeFigureOut">
               <a:rPr lang="en-US" smtClean="0"/>
-              <a:t>3/6/2024</a:t>
+              <a:t>4/10/2024</a:t>
             </a:fld>
             <a:endParaRPr lang="en-US"/>
           </a:p>
@@ -2632,7 +2721,7 @@
           <a:p>
             <a:fld id="{37CC0096-1860-4642-9CD2-0079EA5E7CD1}" type="datetimeFigureOut">
               <a:rPr lang="en-US" smtClean="0"/>
-              <a:t>3/6/2024</a:t>
+              <a:t>4/10/2024</a:t>
             </a:fld>
             <a:endParaRPr lang="en-US"/>
           </a:p>
@@ -2916,7 +3005,7 @@
           <a:p>
             <a:fld id="{37CC0096-1860-4642-9CD2-0079EA5E7CD1}" type="datetimeFigureOut">
               <a:rPr lang="en-US" smtClean="0"/>
-              <a:t>3/6/2024</a:t>
+              <a:t>4/10/2024</a:t>
             </a:fld>
             <a:endParaRPr lang="en-US"/>
           </a:p>
@@ -3227,7 +3316,7 @@
           <a:p>
             <a:fld id="{37CC0096-1860-4642-9CD2-0079EA5E7CD1}" type="datetimeFigureOut">
               <a:rPr lang="en-US" smtClean="0"/>
-              <a:t>3/6/2024</a:t>
+              <a:t>4/10/2024</a:t>
             </a:fld>
             <a:endParaRPr lang="en-US"/>
           </a:p>
@@ -3459,7 +3548,7 @@
             <a:fld id="{37CC0096-1860-4642-9CD2-0079EA5E7CD1}" type="datetimeFigureOut">
               <a:rPr lang="en-US" smtClean="0"/>
               <a:pPr/>
-              <a:t>3/6/2024</a:t>
+              <a:t>4/10/2024</a:t>
             </a:fld>
             <a:endParaRPr lang="en-US"/>
           </a:p>
@@ -3981,38 +4070,30 @@
             </a:r>
             <a:r>
               <a:rPr lang="en-US" dirty="0"/>
-              <a:t> Devos, Finian Horrie, Viktor </a:t>
+              <a:t> Devos, Finian Horrie, </a:t>
+            </a:r>
+            <a:r>
+              <a:rPr lang="en-US" dirty="0" err="1"/>
+              <a:t>Siebe</a:t>
+            </a:r>
+            <a:r>
+              <a:rPr lang="en-US" dirty="0"/>
+              <a:t> </a:t>
+            </a:r>
+            <a:r>
+              <a:rPr lang="en-US" dirty="0" err="1"/>
+              <a:t>Boeckx</a:t>
+            </a:r>
+            <a:endParaRPr lang="en-US" dirty="0"/>
+          </a:p>
+          <a:p>
+            <a:r>
+              <a:rPr lang="en-US" dirty="0"/>
+              <a:t>Presented by: Viktor </a:t>
             </a:r>
             <a:r>
               <a:rPr lang="en-US" dirty="0" err="1"/>
               <a:t>Mendonck</a:t>
-            </a:r>
-            <a:r>
-              <a:rPr lang="en-US" dirty="0"/>
-              <a:t>, </a:t>
-            </a:r>
-            <a:r>
-              <a:rPr lang="en-US" dirty="0" err="1"/>
-              <a:t>Siebe</a:t>
-            </a:r>
-            <a:r>
-              <a:rPr lang="en-US" dirty="0"/>
-              <a:t> </a:t>
-            </a:r>
-            <a:r>
-              <a:rPr lang="en-US" dirty="0" err="1"/>
-              <a:t>Boeckx</a:t>
-            </a:r>
-            <a:endParaRPr lang="en-US" dirty="0"/>
-          </a:p>
-          <a:p>
-            <a:r>
-              <a:rPr lang="en-US" dirty="0"/>
-              <a:t>Presented by: </a:t>
-            </a:r>
-            <a:r>
-              <a:rPr lang="en-GB" dirty="0"/>
-              <a:t>👀</a:t>
             </a:r>
             <a:endParaRPr dirty="0"/>
           </a:p>
@@ -4069,7 +4150,10 @@
           <a:bodyPr/>
           <a:lstStyle/>
           <a:p>
-            <a:endParaRPr lang="nl-BE" dirty="0"/>
+            <a:r>
+              <a:rPr lang="nl-BE" dirty="0"/>
+              <a:t>Global Objects</a:t>
+            </a:r>
           </a:p>
         </p:txBody>
       </p:sp>
@@ -4093,6 +4177,71 @@
         <p:txBody>
           <a:bodyPr/>
           <a:lstStyle/>
+          <a:p>
+            <a:r>
+              <a:rPr lang="en-US" dirty="0"/>
+              <a:t>“Global objects are bad, </a:t>
+            </a:r>
+            <a:r>
+              <a:rPr lang="en-US" dirty="0" err="1"/>
+              <a:t>m’kay</a:t>
+            </a:r>
+            <a:r>
+              <a:rPr lang="en-US" dirty="0"/>
+              <a:t>” – G. Davidson</a:t>
+            </a:r>
+          </a:p>
+          <a:p>
+            <a:r>
+              <a:rPr lang="en-US" dirty="0"/>
+              <a:t>No access restrictions</a:t>
+            </a:r>
+          </a:p>
+          <a:p>
+            <a:r>
+              <a:rPr lang="en-US" dirty="0"/>
+              <a:t>Program is the owner, object lives through program (static)</a:t>
+            </a:r>
+          </a:p>
+          <a:p>
+            <a:r>
+              <a:rPr lang="en-US" dirty="0"/>
+              <a:t>Problematic!</a:t>
+            </a:r>
+          </a:p>
+          <a:p>
+            <a:pPr lvl="1"/>
+            <a:r>
+              <a:rPr lang="en-US" dirty="0"/>
+              <a:t>Ownership fundamental to reason about objects</a:t>
+            </a:r>
+          </a:p>
+          <a:p>
+            <a:pPr lvl="1"/>
+            <a:r>
+              <a:rPr lang="en-US" dirty="0"/>
+              <a:t>How do we know its state?</a:t>
+            </a:r>
+          </a:p>
+          <a:p>
+            <a:pPr lvl="1"/>
+            <a:r>
+              <a:rPr lang="en-US" dirty="0"/>
+              <a:t>No idea of construction order</a:t>
+            </a:r>
+          </a:p>
+          <a:p>
+            <a:pPr marL="0" indent="0">
+              <a:buNone/>
+            </a:pPr>
+            <a:r>
+              <a:rPr lang="en-US" dirty="0"/>
+              <a:t>We need a solution…</a:t>
+            </a:r>
+          </a:p>
+          <a:p>
+            <a:endParaRPr lang="en-US" dirty="0"/>
+          </a:p>
           <a:p>
             <a:pPr marL="0" indent="0">
               <a:buNone/>
@@ -4154,7 +4303,7 @@
           <a:p>
             <a:r>
               <a:rPr lang="en-US" dirty="0"/>
-              <a:t>Summary</a:t>
+              <a:t>Singleton Design Pattern</a:t>
             </a:r>
             <a:endParaRPr lang="nl-BE" dirty="0"/>
           </a:p>
@@ -4183,12 +4332,13 @@
           </a:bodyPr>
           <a:lstStyle/>
           <a:p>
-            <a:endParaRPr lang="en-US" dirty="0"/>
-          </a:p>
-          <a:p>
-            <a:pPr marL="0" indent="0">
-              <a:buNone/>
-            </a:pPr>
+            <a:r>
+              <a:rPr lang="en-US" dirty="0"/>
+              <a:t>Creational pattern</a:t>
+            </a:r>
+          </a:p>
+          <a:p>
+            <a:pPr lvl="1"/>
             <a:endParaRPr lang="en-US" dirty="0"/>
           </a:p>
         </p:txBody>
@@ -4196,7 +4346,7 @@
     </p:spTree>
     <p:extLst>
       <p:ext uri="{BB962C8B-B14F-4D97-AF65-F5344CB8AC3E}">
-        <p14:creationId xmlns:p14="http://schemas.microsoft.com/office/powerpoint/2010/main" val="1371427845"/>
+        <p14:creationId xmlns:p14="http://schemas.microsoft.com/office/powerpoint/2010/main" val="1962647646"/>
       </p:ext>
     </p:extLst>
   </p:cSld>
@@ -4228,6 +4378,98 @@
           <p:cNvPr id="2" name="Title 1">
             <a:extLst>
               <a:ext uri="{FF2B5EF4-FFF2-40B4-BE49-F238E27FC236}">
+                <a16:creationId xmlns:a16="http://schemas.microsoft.com/office/drawing/2014/main" id="{836DA0B8-894A-0344-44A5-2ADF23E811BC}"/>
+              </a:ext>
+            </a:extLst>
+          </p:cNvPr>
+          <p:cNvSpPr>
+            <a:spLocks noGrp="1"/>
+          </p:cNvSpPr>
+          <p:nvPr>
+            <p:ph type="title"/>
+          </p:nvPr>
+        </p:nvSpPr>
+        <p:spPr/>
+        <p:txBody>
+          <a:bodyPr/>
+          <a:lstStyle/>
+          <a:p>
+            <a:r>
+              <a:rPr lang="en-US" dirty="0"/>
+              <a:t>Summary</a:t>
+            </a:r>
+            <a:endParaRPr lang="nl-BE" dirty="0"/>
+          </a:p>
+        </p:txBody>
+      </p:sp>
+      <p:sp>
+        <p:nvSpPr>
+          <p:cNvPr id="3" name="Content Placeholder 2">
+            <a:extLst>
+              <a:ext uri="{FF2B5EF4-FFF2-40B4-BE49-F238E27FC236}">
+                <a16:creationId xmlns:a16="http://schemas.microsoft.com/office/drawing/2014/main" id="{C74DED9C-A947-136E-D883-01C2B671B243}"/>
+              </a:ext>
+            </a:extLst>
+          </p:cNvPr>
+          <p:cNvSpPr>
+            <a:spLocks noGrp="1"/>
+          </p:cNvSpPr>
+          <p:nvPr>
+            <p:ph idx="1"/>
+          </p:nvPr>
+        </p:nvSpPr>
+        <p:spPr/>
+        <p:txBody>
+          <a:bodyPr>
+            <a:normAutofit/>
+          </a:bodyPr>
+          <a:lstStyle/>
+          <a:p>
+            <a:endParaRPr lang="en-US" dirty="0"/>
+          </a:p>
+          <a:p>
+            <a:pPr marL="0" indent="0">
+              <a:buNone/>
+            </a:pPr>
+            <a:endParaRPr lang="en-US" dirty="0"/>
+          </a:p>
+        </p:txBody>
+      </p:sp>
+    </p:spTree>
+    <p:extLst>
+      <p:ext uri="{BB962C8B-B14F-4D97-AF65-F5344CB8AC3E}">
+        <p14:creationId xmlns:p14="http://schemas.microsoft.com/office/powerpoint/2010/main" val="1371427845"/>
+      </p:ext>
+    </p:extLst>
+  </p:cSld>
+  <p:clrMapOvr>
+    <a:masterClrMapping/>
+  </p:clrMapOvr>
+</p:sld>
+</file>
+
+<file path=ppt/slides/slide5.xml><?xml version="1.0" encoding="utf-8"?>
+<p:sld xmlns:a="http://schemas.openxmlformats.org/drawingml/2006/main" xmlns:r="http://schemas.openxmlformats.org/officeDocument/2006/relationships" xmlns:p="http://schemas.openxmlformats.org/presentationml/2006/main">
+  <p:cSld>
+    <p:spTree>
+      <p:nvGrpSpPr>
+        <p:cNvPr id="1" name=""/>
+        <p:cNvGrpSpPr/>
+        <p:nvPr/>
+      </p:nvGrpSpPr>
+      <p:grpSpPr>
+        <a:xfrm>
+          <a:off x="0" y="0"/>
+          <a:ext cx="0" cy="0"/>
+          <a:chOff x="0" y="0"/>
+          <a:chExt cx="0" cy="0"/>
+        </a:xfrm>
+      </p:grpSpPr>
+      <p:sp>
+        <p:nvSpPr>
+          <p:cNvPr id="2" name="Title 1">
+            <a:extLst>
+              <a:ext uri="{FF2B5EF4-FFF2-40B4-BE49-F238E27FC236}">
                 <a16:creationId xmlns:a16="http://schemas.microsoft.com/office/drawing/2014/main" id="{31FED79A-01DE-CB7A-F0FF-EC4A8B17C7C0}"/>
               </a:ext>
             </a:extLst>
@@ -4305,7 +4547,7 @@
 </p:sld>
 </file>
 
-<file path=ppt/slides/slide5.xml><?xml version="1.0" encoding="utf-8"?>
+<file path=ppt/slides/slide6.xml><?xml version="1.0" encoding="utf-8"?>
 <p:sld xmlns:a="http://schemas.openxmlformats.org/drawingml/2006/main" xmlns:r="http://schemas.openxmlformats.org/officeDocument/2006/relationships" xmlns:p="http://schemas.openxmlformats.org/presentationml/2006/main">
   <p:cSld>
     <p:spTree>
@@ -5181,30 +5423,6 @@
 </file>
 
 <file path=customXml/item1.xml><?xml version="1.0" encoding="utf-8"?>
-<?mso-contentType ?>
-<FormTemplates xmlns="http://schemas.microsoft.com/sharepoint/v3/contenttype/forms">
-  <Display>DocumentLibraryForm</Display>
-  <Edit>DocumentLibraryForm</Edit>
-  <New>DocumentLibraryForm</New>
-</FormTemplates>
-</file>
-
-<file path=customXml/item2.xml><?xml version="1.0" encoding="utf-8"?>
-<p:properties xmlns:p="http://schemas.microsoft.com/office/2006/metadata/properties" xmlns:xsi="http://www.w3.org/2001/XMLSchema-instance" xmlns:pc="http://schemas.microsoft.com/office/infopath/2007/PartnerControls">
-  <documentManagement>
-    <lcf76f155ced4ddcb4097134ff3c332f xmlns="60eb0cf4-ae2a-4762-800a-cb593b869ecb">
-      <Terms xmlns="http://schemas.microsoft.com/office/infopath/2007/PartnerControls"/>
-    </lcf76f155ced4ddcb4097134ff3c332f>
-    <IconOverlay xmlns="http://schemas.microsoft.com/sharepoint/v4" xsi:nil="true"/>
-    <TaxCatchAll xmlns="128482ec-0431-40d5-ab26-89ea2a4f3ccd" xsi:nil="true"/>
-    <m99485b88215436a82099f8287cba0b0 xmlns="128482ec-0431-40d5-ab26-89ea2a4f3ccd">
-      <Terms xmlns="http://schemas.microsoft.com/office/infopath/2007/PartnerControls"/>
-    </m99485b88215436a82099f8287cba0b0>
-  </documentManagement>
-</p:properties>
-</file>
-
-<file path=customXml/item3.xml><?xml version="1.0" encoding="utf-8"?>
 <ct:contentTypeSchema xmlns:ct="http://schemas.microsoft.com/office/2006/metadata/contentType" xmlns:ma="http://schemas.microsoft.com/office/2006/metadata/properties/metaAttributes" ct:_="" ma:_="" ma:contentTypeName="Document" ma:contentTypeID="0x010100723942CCEB3A674D8F1F6472CCEFB38E" ma:contentTypeVersion="12" ma:contentTypeDescription="Create a new document." ma:contentTypeScope="" ma:versionID="f7d503e4e5f2150aa73d4fab685f27ad">
   <xsd:schema xmlns:xsd="http://www.w3.org/2001/XMLSchema" xmlns:xs="http://www.w3.org/2001/XMLSchema" xmlns:p="http://schemas.microsoft.com/office/2006/metadata/properties" xmlns:ns2="128482ec-0431-40d5-ab26-89ea2a4f3ccd" xmlns:ns3="60eb0cf4-ae2a-4762-800a-cb593b869ecb" xmlns:ns4="http://schemas.microsoft.com/sharepoint/v4" xmlns:ns5="a2e691a9-fcfc-4d85-a390-1894fe98bd9e" targetNamespace="http://schemas.microsoft.com/office/2006/metadata/properties" ma:root="true" ma:fieldsID="cdaef380ec0413f963fceb43e408d365" ns2:_="" ns3:_="" ns4:_="" ns5:_="">
     <xsd:import namespace="128482ec-0431-40d5-ab26-89ea2a4f3ccd"/>
@@ -5483,27 +5701,31 @@
 </ct:contentTypeSchema>
 </file>
 
-<file path=customXml/itemProps1.xml><?xml version="1.0" encoding="utf-8"?>
-<ds:datastoreItem xmlns:ds="http://schemas.openxmlformats.org/officeDocument/2006/customXml" ds:itemID="{2D249758-9633-43E2-B21C-3D93EE8C5DA1}">
-  <ds:schemaRefs>
-    <ds:schemaRef ds:uri="http://schemas.microsoft.com/sharepoint/v3/contenttype/forms"/>
-  </ds:schemaRefs>
-</ds:datastoreItem>
+<file path=customXml/item2.xml><?xml version="1.0" encoding="utf-8"?>
+<p:properties xmlns:p="http://schemas.microsoft.com/office/2006/metadata/properties" xmlns:xsi="http://www.w3.org/2001/XMLSchema-instance" xmlns:pc="http://schemas.microsoft.com/office/infopath/2007/PartnerControls">
+  <documentManagement>
+    <lcf76f155ced4ddcb4097134ff3c332f xmlns="60eb0cf4-ae2a-4762-800a-cb593b869ecb">
+      <Terms xmlns="http://schemas.microsoft.com/office/infopath/2007/PartnerControls"/>
+    </lcf76f155ced4ddcb4097134ff3c332f>
+    <IconOverlay xmlns="http://schemas.microsoft.com/sharepoint/v4" xsi:nil="true"/>
+    <TaxCatchAll xmlns="128482ec-0431-40d5-ab26-89ea2a4f3ccd" xsi:nil="true"/>
+    <m99485b88215436a82099f8287cba0b0 xmlns="128482ec-0431-40d5-ab26-89ea2a4f3ccd">
+      <Terms xmlns="http://schemas.microsoft.com/office/infopath/2007/PartnerControls"/>
+    </m99485b88215436a82099f8287cba0b0>
+  </documentManagement>
+</p:properties>
 </file>
 
-<file path=customXml/itemProps2.xml><?xml version="1.0" encoding="utf-8"?>
-<ds:datastoreItem xmlns:ds="http://schemas.openxmlformats.org/officeDocument/2006/customXml" ds:itemID="{59359FEE-EE2A-4F2D-A45F-DFDF5ED95444}">
-  <ds:schemaRefs>
-    <ds:schemaRef ds:uri="http://schemas.microsoft.com/office/2006/metadata/properties"/>
-    <ds:schemaRef ds:uri="http://schemas.microsoft.com/office/infopath/2007/PartnerControls"/>
-    <ds:schemaRef ds:uri="60eb0cf4-ae2a-4762-800a-cb593b869ecb"/>
-    <ds:schemaRef ds:uri="http://schemas.microsoft.com/sharepoint/v4"/>
-    <ds:schemaRef ds:uri="128482ec-0431-40d5-ab26-89ea2a4f3ccd"/>
-  </ds:schemaRefs>
-</ds:datastoreItem>
+<file path=customXml/item3.xml><?xml version="1.0" encoding="utf-8"?>
+<?mso-contentType ?>
+<FormTemplates xmlns="http://schemas.microsoft.com/sharepoint/v3/contenttype/forms">
+  <Display>DocumentLibraryForm</Display>
+  <Edit>DocumentLibraryForm</Edit>
+  <New>DocumentLibraryForm</New>
+</FormTemplates>
 </file>
 
-<file path=customXml/itemProps3.xml><?xml version="1.0" encoding="utf-8"?>
+<file path=customXml/itemProps1.xml><?xml version="1.0" encoding="utf-8"?>
 <ds:datastoreItem xmlns:ds="http://schemas.openxmlformats.org/officeDocument/2006/customXml" ds:itemID="{EDF218E0-BDAF-4F27-A5F6-FDBA0507EB21}">
   <ds:schemaRefs>
     <ds:schemaRef ds:uri="http://schemas.microsoft.com/office/2006/metadata/contentType"/>
@@ -5522,4 +5744,24 @@
     <ds:schemaRef ds:uri="http://schemas.microsoft.com/internal/obd"/>
   </ds:schemaRefs>
 </ds:datastoreItem>
+</file>
+
+<file path=customXml/itemProps2.xml><?xml version="1.0" encoding="utf-8"?>
+<ds:datastoreItem xmlns:ds="http://schemas.openxmlformats.org/officeDocument/2006/customXml" ds:itemID="{59359FEE-EE2A-4F2D-A45F-DFDF5ED95444}">
+  <ds:schemaRefs>
+    <ds:schemaRef ds:uri="http://schemas.microsoft.com/office/2006/metadata/properties"/>
+    <ds:schemaRef ds:uri="http://schemas.microsoft.com/office/infopath/2007/PartnerControls"/>
+    <ds:schemaRef ds:uri="60eb0cf4-ae2a-4762-800a-cb593b869ecb"/>
+    <ds:schemaRef ds:uri="http://schemas.microsoft.com/sharepoint/v4"/>
+    <ds:schemaRef ds:uri="128482ec-0431-40d5-ab26-89ea2a4f3ccd"/>
+  </ds:schemaRefs>
+</ds:datastoreItem>
+</file>
+
+<file path=customXml/itemProps3.xml><?xml version="1.0" encoding="utf-8"?>
+<ds:datastoreItem xmlns:ds="http://schemas.openxmlformats.org/officeDocument/2006/customXml" ds:itemID="{2D249758-9633-43E2-B21C-3D93EE8C5DA1}">
+  <ds:schemaRefs>
+    <ds:schemaRef ds:uri="http://schemas.microsoft.com/sharepoint/v3/contenttype/forms"/>
+  </ds:schemaRefs>
+</ds:datastoreItem>
 </file>
</xml_diff>

<commit_message>
Feat: added 2 new slides and updated initial slide
</commit_message>
<xml_diff>
--- a/Beautiful C++ ch3-2 I.3.pptx
+++ b/Beautiful C++ ch3-2 I.3.pptx
@@ -5,18 +5,19 @@
     <p:sldMasterId id="2147483648" r:id="rId4"/>
   </p:sldMasterIdLst>
   <p:notesMasterIdLst>
-    <p:notesMasterId r:id="rId11"/>
+    <p:notesMasterId r:id="rId12"/>
   </p:notesMasterIdLst>
   <p:handoutMasterIdLst>
-    <p:handoutMasterId r:id="rId12"/>
+    <p:handoutMasterId r:id="rId13"/>
   </p:handoutMasterIdLst>
   <p:sldIdLst>
     <p:sldId id="256" r:id="rId5"/>
     <p:sldId id="289" r:id="rId6"/>
     <p:sldId id="294" r:id="rId7"/>
-    <p:sldId id="293" r:id="rId8"/>
-    <p:sldId id="288" r:id="rId9"/>
-    <p:sldId id="285" r:id="rId10"/>
+    <p:sldId id="295" r:id="rId8"/>
+    <p:sldId id="293" r:id="rId9"/>
+    <p:sldId id="288" r:id="rId10"/>
+    <p:sldId id="285" r:id="rId11"/>
   </p:sldIdLst>
   <p:sldSz cx="12192000" cy="6858000"/>
   <p:notesSz cx="6858000" cy="9144000"/>
@@ -219,7 +220,7 @@
           <a:p>
             <a:fld id="{762B48F5-BACC-47D6-A0F7-82FBF9C6BC85}" type="datetimeFigureOut">
               <a:rPr lang="en-US"/>
-              <a:t>4/10/2024</a:t>
+              <a:t>4/14/2024</a:t>
             </a:fld>
             <a:endParaRPr/>
           </a:p>
@@ -384,7 +385,7 @@
           <a:p>
             <a:fld id="{0CB1CD00-5424-4675-AB18-2C419B060449}" type="datetimeFigureOut">
               <a:rPr lang="en-US"/>
-              <a:t>4/10/2024</a:t>
+              <a:t>4/14/2024</a:t>
             </a:fld>
             <a:endParaRPr/>
           </a:p>
@@ -883,7 +884,7 @@
           <a:p>
             <a:fld id="{5EE2CF44-2B13-41B4-A334-1CDF534EEBBF}" type="slidenum">
               <a:rPr lang="en-BE" smtClean="0"/>
-              <a:t>6</a:t>
+              <a:t>7</a:t>
             </a:fld>
             <a:endParaRPr lang="en-BE"/>
           </a:p>
@@ -1285,7 +1286,7 @@
           <a:p>
             <a:fld id="{37CC0096-1860-4642-9CD2-0079EA5E7CD1}" type="datetimeFigureOut">
               <a:rPr lang="en-US" smtClean="0"/>
-              <a:t>4/10/2024</a:t>
+              <a:t>4/14/2024</a:t>
             </a:fld>
             <a:endParaRPr lang="en-US"/>
           </a:p>
@@ -1464,7 +1465,7 @@
           <a:p>
             <a:fld id="{37CC0096-1860-4642-9CD2-0079EA5E7CD1}" type="datetimeFigureOut">
               <a:rPr lang="en-US" smtClean="0"/>
-              <a:t>4/10/2024</a:t>
+              <a:t>4/14/2024</a:t>
             </a:fld>
             <a:endParaRPr lang="en-US"/>
           </a:p>
@@ -1637,7 +1638,7 @@
           <a:p>
             <a:fld id="{37CC0096-1860-4642-9CD2-0079EA5E7CD1}" type="datetimeFigureOut">
               <a:rPr lang="en-US" smtClean="0"/>
-              <a:t>4/10/2024</a:t>
+              <a:t>4/14/2024</a:t>
             </a:fld>
             <a:endParaRPr lang="en-US"/>
           </a:p>
@@ -2070,7 +2071,7 @@
           <a:p>
             <a:fld id="{37CC0096-1860-4642-9CD2-0079EA5E7CD1}" type="datetimeFigureOut">
               <a:rPr lang="en-US" smtClean="0"/>
-              <a:t>4/10/2024</a:t>
+              <a:t>4/14/2024</a:t>
             </a:fld>
             <a:endParaRPr lang="en-US"/>
           </a:p>
@@ -2509,7 +2510,7 @@
           <a:p>
             <a:fld id="{37CC0096-1860-4642-9CD2-0079EA5E7CD1}" type="datetimeFigureOut">
               <a:rPr lang="en-US" smtClean="0"/>
-              <a:t>4/10/2024</a:t>
+              <a:t>4/14/2024</a:t>
             </a:fld>
             <a:endParaRPr lang="en-US"/>
           </a:p>
@@ -2626,7 +2627,7 @@
           <a:p>
             <a:fld id="{37CC0096-1860-4642-9CD2-0079EA5E7CD1}" type="datetimeFigureOut">
               <a:rPr lang="en-US" smtClean="0"/>
-              <a:t>4/10/2024</a:t>
+              <a:t>4/14/2024</a:t>
             </a:fld>
             <a:endParaRPr lang="en-US"/>
           </a:p>
@@ -2721,7 +2722,7 @@
           <a:p>
             <a:fld id="{37CC0096-1860-4642-9CD2-0079EA5E7CD1}" type="datetimeFigureOut">
               <a:rPr lang="en-US" smtClean="0"/>
-              <a:t>4/10/2024</a:t>
+              <a:t>4/14/2024</a:t>
             </a:fld>
             <a:endParaRPr lang="en-US"/>
           </a:p>
@@ -3005,7 +3006,7 @@
           <a:p>
             <a:fld id="{37CC0096-1860-4642-9CD2-0079EA5E7CD1}" type="datetimeFigureOut">
               <a:rPr lang="en-US" smtClean="0"/>
-              <a:t>4/10/2024</a:t>
+              <a:t>4/14/2024</a:t>
             </a:fld>
             <a:endParaRPr lang="en-US"/>
           </a:p>
@@ -3316,7 +3317,7 @@
           <a:p>
             <a:fld id="{37CC0096-1860-4642-9CD2-0079EA5E7CD1}" type="datetimeFigureOut">
               <a:rPr lang="en-US" smtClean="0"/>
-              <a:t>4/10/2024</a:t>
+              <a:t>4/14/2024</a:t>
             </a:fld>
             <a:endParaRPr lang="en-US"/>
           </a:p>
@@ -3548,7 +3549,7 @@
             <a:fld id="{37CC0096-1860-4642-9CD2-0079EA5E7CD1}" type="datetimeFigureOut">
               <a:rPr lang="en-US" smtClean="0"/>
               <a:pPr/>
-              <a:t>4/10/2024</a:t>
+              <a:t>4/14/2024</a:t>
             </a:fld>
             <a:endParaRPr lang="en-US"/>
           </a:p>
@@ -4062,7 +4063,7 @@
           <a:p>
             <a:r>
               <a:rPr lang="en-US" dirty="0"/>
-              <a:t>Prepared by: </a:t>
+              <a:t>Slides by: </a:t>
             </a:r>
             <a:r>
               <a:rPr lang="en-US" dirty="0" err="1"/>
@@ -4338,7 +4339,43 @@
             </a:r>
           </a:p>
           <a:p>
+            <a:r>
+              <a:rPr lang="en-US" dirty="0"/>
+              <a:t>Only make one instance something</a:t>
+            </a:r>
+          </a:p>
+          <a:p>
+            <a:r>
+              <a:rPr lang="en-US" dirty="0"/>
+              <a:t>Characterized by name “Manager”</a:t>
+            </a:r>
+          </a:p>
+          <a:p>
+            <a:r>
+              <a:rPr lang="en-US" dirty="0"/>
+              <a:t>Ownership decision problems</a:t>
+            </a:r>
+          </a:p>
+          <a:p>
+            <a:r>
+              <a:rPr lang="en-US" dirty="0"/>
+              <a:t>Prone to “Static initialization order fiasco”</a:t>
+            </a:r>
+          </a:p>
+          <a:p>
             <a:pPr lvl="1"/>
+            <a:r>
+              <a:rPr lang="en-US" dirty="0"/>
+              <a:t>Circular dependencies among global objects</a:t>
+            </a:r>
+          </a:p>
+          <a:p>
+            <a:endParaRPr lang="en-US" dirty="0"/>
+          </a:p>
+          <a:p>
+            <a:endParaRPr lang="en-US" dirty="0"/>
+          </a:p>
+          <a:p>
             <a:endParaRPr lang="en-US" dirty="0"/>
           </a:p>
         </p:txBody>
@@ -4395,8 +4432,8 @@
           <a:lstStyle/>
           <a:p>
             <a:r>
-              <a:rPr lang="en-US" dirty="0"/>
-              <a:t>Summary</a:t>
+              <a:rPr lang="nl-BE"/>
+              <a:t>Order of global construction</a:t>
             </a:r>
             <a:endParaRPr lang="nl-BE" dirty="0"/>
           </a:p>
@@ -4425,12 +4462,45 @@
           </a:bodyPr>
           <a:lstStyle/>
           <a:p>
-            <a:endParaRPr lang="en-US" dirty="0"/>
-          </a:p>
-          <a:p>
-            <a:pPr marL="0" indent="0">
-              <a:buNone/>
-            </a:pPr>
+            <a:r>
+              <a:rPr lang="en-US" dirty="0"/>
+              <a:t>“Can we tell the linker what order global objects should be constructed?”</a:t>
+            </a:r>
+          </a:p>
+          <a:p>
+            <a:pPr lvl="1"/>
+            <a:r>
+              <a:rPr lang="en-US" dirty="0"/>
+              <a:t>Has been tried</a:t>
+            </a:r>
+          </a:p>
+          <a:p>
+            <a:pPr lvl="1"/>
+            <a:r>
+              <a:rPr lang="en-US" dirty="0"/>
+              <a:t>Not standard C++</a:t>
+            </a:r>
+          </a:p>
+          <a:p>
+            <a:r>
+              <a:rPr lang="en-US" dirty="0"/>
+              <a:t>“Why not standardize?”</a:t>
+            </a:r>
+          </a:p>
+          <a:p>
+            <a:pPr lvl="1"/>
+            <a:r>
+              <a:rPr lang="en-US" dirty="0"/>
+              <a:t>Easy to hurt yourself with global static object dependencies</a:t>
+            </a:r>
+          </a:p>
+          <a:p>
+            <a:r>
+              <a:rPr lang="en-US" dirty="0"/>
+              <a:t>Static object initialization is specified by order of declaration, per translation unit</a:t>
+            </a:r>
+          </a:p>
+          <a:p>
             <a:endParaRPr lang="en-US" dirty="0"/>
           </a:p>
         </p:txBody>
@@ -4438,7 +4508,7 @@
     </p:spTree>
     <p:extLst>
       <p:ext uri="{BB962C8B-B14F-4D97-AF65-F5344CB8AC3E}">
-        <p14:creationId xmlns:p14="http://schemas.microsoft.com/office/powerpoint/2010/main" val="1371427845"/>
+        <p14:creationId xmlns:p14="http://schemas.microsoft.com/office/powerpoint/2010/main" val="2622524518"/>
       </p:ext>
     </p:extLst>
   </p:cSld>
@@ -4470,6 +4540,98 @@
           <p:cNvPr id="2" name="Title 1">
             <a:extLst>
               <a:ext uri="{FF2B5EF4-FFF2-40B4-BE49-F238E27FC236}">
+                <a16:creationId xmlns:a16="http://schemas.microsoft.com/office/drawing/2014/main" id="{836DA0B8-894A-0344-44A5-2ADF23E811BC}"/>
+              </a:ext>
+            </a:extLst>
+          </p:cNvPr>
+          <p:cNvSpPr>
+            <a:spLocks noGrp="1"/>
+          </p:cNvSpPr>
+          <p:nvPr>
+            <p:ph type="title"/>
+          </p:nvPr>
+        </p:nvSpPr>
+        <p:spPr/>
+        <p:txBody>
+          <a:bodyPr/>
+          <a:lstStyle/>
+          <a:p>
+            <a:r>
+              <a:rPr lang="en-US" dirty="0"/>
+              <a:t>Summary</a:t>
+            </a:r>
+            <a:endParaRPr lang="nl-BE" dirty="0"/>
+          </a:p>
+        </p:txBody>
+      </p:sp>
+      <p:sp>
+        <p:nvSpPr>
+          <p:cNvPr id="3" name="Content Placeholder 2">
+            <a:extLst>
+              <a:ext uri="{FF2B5EF4-FFF2-40B4-BE49-F238E27FC236}">
+                <a16:creationId xmlns:a16="http://schemas.microsoft.com/office/drawing/2014/main" id="{C74DED9C-A947-136E-D883-01C2B671B243}"/>
+              </a:ext>
+            </a:extLst>
+          </p:cNvPr>
+          <p:cNvSpPr>
+            <a:spLocks noGrp="1"/>
+          </p:cNvSpPr>
+          <p:nvPr>
+            <p:ph idx="1"/>
+          </p:nvPr>
+        </p:nvSpPr>
+        <p:spPr/>
+        <p:txBody>
+          <a:bodyPr>
+            <a:normAutofit/>
+          </a:bodyPr>
+          <a:lstStyle/>
+          <a:p>
+            <a:endParaRPr lang="en-US" dirty="0"/>
+          </a:p>
+          <a:p>
+            <a:pPr marL="0" indent="0">
+              <a:buNone/>
+            </a:pPr>
+            <a:endParaRPr lang="en-US" dirty="0"/>
+          </a:p>
+        </p:txBody>
+      </p:sp>
+    </p:spTree>
+    <p:extLst>
+      <p:ext uri="{BB962C8B-B14F-4D97-AF65-F5344CB8AC3E}">
+        <p14:creationId xmlns:p14="http://schemas.microsoft.com/office/powerpoint/2010/main" val="1371427845"/>
+      </p:ext>
+    </p:extLst>
+  </p:cSld>
+  <p:clrMapOvr>
+    <a:masterClrMapping/>
+  </p:clrMapOvr>
+</p:sld>
+</file>
+
+<file path=ppt/slides/slide6.xml><?xml version="1.0" encoding="utf-8"?>
+<p:sld xmlns:a="http://schemas.openxmlformats.org/drawingml/2006/main" xmlns:r="http://schemas.openxmlformats.org/officeDocument/2006/relationships" xmlns:p="http://schemas.openxmlformats.org/presentationml/2006/main">
+  <p:cSld>
+    <p:spTree>
+      <p:nvGrpSpPr>
+        <p:cNvPr id="1" name=""/>
+        <p:cNvGrpSpPr/>
+        <p:nvPr/>
+      </p:nvGrpSpPr>
+      <p:grpSpPr>
+        <a:xfrm>
+          <a:off x="0" y="0"/>
+          <a:ext cx="0" cy="0"/>
+          <a:chOff x="0" y="0"/>
+          <a:chExt cx="0" cy="0"/>
+        </a:xfrm>
+      </p:grpSpPr>
+      <p:sp>
+        <p:nvSpPr>
+          <p:cNvPr id="2" name="Title 1">
+            <a:extLst>
+              <a:ext uri="{FF2B5EF4-FFF2-40B4-BE49-F238E27FC236}">
                 <a16:creationId xmlns:a16="http://schemas.microsoft.com/office/drawing/2014/main" id="{31FED79A-01DE-CB7A-F0FF-EC4A8B17C7C0}"/>
               </a:ext>
             </a:extLst>
@@ -4547,7 +4709,7 @@
 </p:sld>
 </file>
 
-<file path=ppt/slides/slide6.xml><?xml version="1.0" encoding="utf-8"?>
+<file path=ppt/slides/slide7.xml><?xml version="1.0" encoding="utf-8"?>
 <p:sld xmlns:a="http://schemas.openxmlformats.org/drawingml/2006/main" xmlns:r="http://schemas.openxmlformats.org/officeDocument/2006/relationships" xmlns:p="http://schemas.openxmlformats.org/presentationml/2006/main">
   <p:cSld>
     <p:spTree>

</xml_diff>

<commit_message>
Added a bunch of slides to the pptx
</commit_message>
<xml_diff>
--- a/Beautiful C++ ch3-2 I.3.pptx
+++ b/Beautiful C++ ch3-2 I.3.pptx
@@ -5,19 +5,24 @@
     <p:sldMasterId id="2147483648" r:id="rId4"/>
   </p:sldMasterIdLst>
   <p:notesMasterIdLst>
-    <p:notesMasterId r:id="rId12"/>
+    <p:notesMasterId r:id="rId17"/>
   </p:notesMasterIdLst>
   <p:handoutMasterIdLst>
-    <p:handoutMasterId r:id="rId13"/>
+    <p:handoutMasterId r:id="rId18"/>
   </p:handoutMasterIdLst>
   <p:sldIdLst>
     <p:sldId id="256" r:id="rId5"/>
     <p:sldId id="289" r:id="rId6"/>
     <p:sldId id="294" r:id="rId7"/>
     <p:sldId id="295" r:id="rId8"/>
-    <p:sldId id="293" r:id="rId9"/>
-    <p:sldId id="288" r:id="rId10"/>
-    <p:sldId id="285" r:id="rId11"/>
+    <p:sldId id="296" r:id="rId9"/>
+    <p:sldId id="297" r:id="rId10"/>
+    <p:sldId id="300" r:id="rId11"/>
+    <p:sldId id="299" r:id="rId12"/>
+    <p:sldId id="301" r:id="rId13"/>
+    <p:sldId id="293" r:id="rId14"/>
+    <p:sldId id="288" r:id="rId15"/>
+    <p:sldId id="285" r:id="rId16"/>
   </p:sldIdLst>
   <p:sldSz cx="12192000" cy="6858000"/>
   <p:notesSz cx="6858000" cy="9144000"/>
@@ -220,7 +225,7 @@
           <a:p>
             <a:fld id="{762B48F5-BACC-47D6-A0F7-82FBF9C6BC85}" type="datetimeFigureOut">
               <a:rPr lang="en-US"/>
-              <a:t>4/14/2024</a:t>
+              <a:t>4/18/2024</a:t>
             </a:fld>
             <a:endParaRPr/>
           </a:p>
@@ -385,7 +390,7 @@
           <a:p>
             <a:fld id="{0CB1CD00-5424-4675-AB18-2C419B060449}" type="datetimeFigureOut">
               <a:rPr lang="en-US"/>
-              <a:t>4/14/2024</a:t>
+              <a:t>4/18/2024</a:t>
             </a:fld>
             <a:endParaRPr/>
           </a:p>
@@ -884,7 +889,7 @@
           <a:p>
             <a:fld id="{5EE2CF44-2B13-41B4-A334-1CDF534EEBBF}" type="slidenum">
               <a:rPr lang="en-BE" smtClean="0"/>
-              <a:t>7</a:t>
+              <a:t>12</a:t>
             </a:fld>
             <a:endParaRPr lang="en-BE"/>
           </a:p>
@@ -1286,7 +1291,7 @@
           <a:p>
             <a:fld id="{37CC0096-1860-4642-9CD2-0079EA5E7CD1}" type="datetimeFigureOut">
               <a:rPr lang="en-US" smtClean="0"/>
-              <a:t>4/14/2024</a:t>
+              <a:t>4/18/2024</a:t>
             </a:fld>
             <a:endParaRPr lang="en-US"/>
           </a:p>
@@ -1465,7 +1470,7 @@
           <a:p>
             <a:fld id="{37CC0096-1860-4642-9CD2-0079EA5E7CD1}" type="datetimeFigureOut">
               <a:rPr lang="en-US" smtClean="0"/>
-              <a:t>4/14/2024</a:t>
+              <a:t>4/18/2024</a:t>
             </a:fld>
             <a:endParaRPr lang="en-US"/>
           </a:p>
@@ -1638,7 +1643,7 @@
           <a:p>
             <a:fld id="{37CC0096-1860-4642-9CD2-0079EA5E7CD1}" type="datetimeFigureOut">
               <a:rPr lang="en-US" smtClean="0"/>
-              <a:t>4/14/2024</a:t>
+              <a:t>4/18/2024</a:t>
             </a:fld>
             <a:endParaRPr lang="en-US"/>
           </a:p>
@@ -2071,7 +2076,7 @@
           <a:p>
             <a:fld id="{37CC0096-1860-4642-9CD2-0079EA5E7CD1}" type="datetimeFigureOut">
               <a:rPr lang="en-US" smtClean="0"/>
-              <a:t>4/14/2024</a:t>
+              <a:t>4/18/2024</a:t>
             </a:fld>
             <a:endParaRPr lang="en-US"/>
           </a:p>
@@ -2510,7 +2515,7 @@
           <a:p>
             <a:fld id="{37CC0096-1860-4642-9CD2-0079EA5E7CD1}" type="datetimeFigureOut">
               <a:rPr lang="en-US" smtClean="0"/>
-              <a:t>4/14/2024</a:t>
+              <a:t>4/18/2024</a:t>
             </a:fld>
             <a:endParaRPr lang="en-US"/>
           </a:p>
@@ -2627,7 +2632,7 @@
           <a:p>
             <a:fld id="{37CC0096-1860-4642-9CD2-0079EA5E7CD1}" type="datetimeFigureOut">
               <a:rPr lang="en-US" smtClean="0"/>
-              <a:t>4/14/2024</a:t>
+              <a:t>4/18/2024</a:t>
             </a:fld>
             <a:endParaRPr lang="en-US"/>
           </a:p>
@@ -2722,7 +2727,7 @@
           <a:p>
             <a:fld id="{37CC0096-1860-4642-9CD2-0079EA5E7CD1}" type="datetimeFigureOut">
               <a:rPr lang="en-US" smtClean="0"/>
-              <a:t>4/14/2024</a:t>
+              <a:t>4/18/2024</a:t>
             </a:fld>
             <a:endParaRPr lang="en-US"/>
           </a:p>
@@ -3006,7 +3011,7 @@
           <a:p>
             <a:fld id="{37CC0096-1860-4642-9CD2-0079EA5E7CD1}" type="datetimeFigureOut">
               <a:rPr lang="en-US" smtClean="0"/>
-              <a:t>4/14/2024</a:t>
+              <a:t>4/18/2024</a:t>
             </a:fld>
             <a:endParaRPr lang="en-US"/>
           </a:p>
@@ -3317,7 +3322,7 @@
           <a:p>
             <a:fld id="{37CC0096-1860-4642-9CD2-0079EA5E7CD1}" type="datetimeFigureOut">
               <a:rPr lang="en-US" smtClean="0"/>
-              <a:t>4/14/2024</a:t>
+              <a:t>4/18/2024</a:t>
             </a:fld>
             <a:endParaRPr lang="en-US"/>
           </a:p>
@@ -3549,7 +3554,7 @@
             <a:fld id="{37CC0096-1860-4642-9CD2-0079EA5E7CD1}" type="datetimeFigureOut">
               <a:rPr lang="en-US" smtClean="0"/>
               <a:pPr/>
-              <a:t>4/14/2024</a:t>
+              <a:t>4/18/2024</a:t>
             </a:fld>
             <a:endParaRPr lang="en-US"/>
           </a:p>
@@ -4113,6 +4118,289 @@
 </p:sld>
 </file>
 
+<file path=ppt/slides/slide10.xml><?xml version="1.0" encoding="utf-8"?>
+<p:sld xmlns:a="http://schemas.openxmlformats.org/drawingml/2006/main" xmlns:r="http://schemas.openxmlformats.org/officeDocument/2006/relationships" xmlns:p="http://schemas.openxmlformats.org/presentationml/2006/main">
+  <p:cSld>
+    <p:spTree>
+      <p:nvGrpSpPr>
+        <p:cNvPr id="1" name=""/>
+        <p:cNvGrpSpPr/>
+        <p:nvPr/>
+      </p:nvGrpSpPr>
+      <p:grpSpPr>
+        <a:xfrm>
+          <a:off x="0" y="0"/>
+          <a:ext cx="0" cy="0"/>
+          <a:chOff x="0" y="0"/>
+          <a:chExt cx="0" cy="0"/>
+        </a:xfrm>
+      </p:grpSpPr>
+      <p:sp>
+        <p:nvSpPr>
+          <p:cNvPr id="2" name="Title 1">
+            <a:extLst>
+              <a:ext uri="{FF2B5EF4-FFF2-40B4-BE49-F238E27FC236}">
+                <a16:creationId xmlns:a16="http://schemas.microsoft.com/office/drawing/2014/main" id="{836DA0B8-894A-0344-44A5-2ADF23E811BC}"/>
+              </a:ext>
+            </a:extLst>
+          </p:cNvPr>
+          <p:cNvSpPr>
+            <a:spLocks noGrp="1"/>
+          </p:cNvSpPr>
+          <p:nvPr>
+            <p:ph type="title"/>
+          </p:nvPr>
+        </p:nvSpPr>
+        <p:spPr/>
+        <p:txBody>
+          <a:bodyPr/>
+          <a:lstStyle/>
+          <a:p>
+            <a:r>
+              <a:rPr lang="en-US" dirty="0"/>
+              <a:t>Summary</a:t>
+            </a:r>
+            <a:endParaRPr lang="nl-BE" dirty="0"/>
+          </a:p>
+        </p:txBody>
+      </p:sp>
+      <p:sp>
+        <p:nvSpPr>
+          <p:cNvPr id="3" name="Content Placeholder 2">
+            <a:extLst>
+              <a:ext uri="{FF2B5EF4-FFF2-40B4-BE49-F238E27FC236}">
+                <a16:creationId xmlns:a16="http://schemas.microsoft.com/office/drawing/2014/main" id="{C74DED9C-A947-136E-D883-01C2B671B243}"/>
+              </a:ext>
+            </a:extLst>
+          </p:cNvPr>
+          <p:cNvSpPr>
+            <a:spLocks noGrp="1"/>
+          </p:cNvSpPr>
+          <p:nvPr>
+            <p:ph idx="1"/>
+          </p:nvPr>
+        </p:nvSpPr>
+        <p:spPr/>
+        <p:txBody>
+          <a:bodyPr>
+            <a:normAutofit/>
+          </a:bodyPr>
+          <a:lstStyle/>
+          <a:p>
+            <a:endParaRPr lang="en-US" dirty="0"/>
+          </a:p>
+          <a:p>
+            <a:pPr marL="0" indent="0">
+              <a:buNone/>
+            </a:pPr>
+            <a:endParaRPr lang="en-US" dirty="0"/>
+          </a:p>
+        </p:txBody>
+      </p:sp>
+    </p:spTree>
+    <p:extLst>
+      <p:ext uri="{BB962C8B-B14F-4D97-AF65-F5344CB8AC3E}">
+        <p14:creationId xmlns:p14="http://schemas.microsoft.com/office/powerpoint/2010/main" val="1371427845"/>
+      </p:ext>
+    </p:extLst>
+  </p:cSld>
+  <p:clrMapOvr>
+    <a:masterClrMapping/>
+  </p:clrMapOvr>
+</p:sld>
+</file>
+
+<file path=ppt/slides/slide11.xml><?xml version="1.0" encoding="utf-8"?>
+<p:sld xmlns:a="http://schemas.openxmlformats.org/drawingml/2006/main" xmlns:r="http://schemas.openxmlformats.org/officeDocument/2006/relationships" xmlns:p="http://schemas.openxmlformats.org/presentationml/2006/main">
+  <p:cSld>
+    <p:spTree>
+      <p:nvGrpSpPr>
+        <p:cNvPr id="1" name=""/>
+        <p:cNvGrpSpPr/>
+        <p:nvPr/>
+      </p:nvGrpSpPr>
+      <p:grpSpPr>
+        <a:xfrm>
+          <a:off x="0" y="0"/>
+          <a:ext cx="0" cy="0"/>
+          <a:chOff x="0" y="0"/>
+          <a:chExt cx="0" cy="0"/>
+        </a:xfrm>
+      </p:grpSpPr>
+      <p:sp>
+        <p:nvSpPr>
+          <p:cNvPr id="2" name="Title 1">
+            <a:extLst>
+              <a:ext uri="{FF2B5EF4-FFF2-40B4-BE49-F238E27FC236}">
+                <a16:creationId xmlns:a16="http://schemas.microsoft.com/office/drawing/2014/main" id="{31FED79A-01DE-CB7A-F0FF-EC4A8B17C7C0}"/>
+              </a:ext>
+            </a:extLst>
+          </p:cNvPr>
+          <p:cNvSpPr>
+            <a:spLocks noGrp="1"/>
+          </p:cNvSpPr>
+          <p:nvPr>
+            <p:ph type="title"/>
+          </p:nvPr>
+        </p:nvSpPr>
+        <p:spPr/>
+        <p:txBody>
+          <a:bodyPr/>
+          <a:lstStyle/>
+          <a:p>
+            <a:r>
+              <a:rPr lang="en-US" dirty="0"/>
+              <a:t>Summary [155 &lt; 160char]</a:t>
+            </a:r>
+            <a:endParaRPr lang="nl-BE" dirty="0"/>
+          </a:p>
+        </p:txBody>
+      </p:sp>
+      <p:sp>
+        <p:nvSpPr>
+          <p:cNvPr id="3" name="Content Placeholder 2">
+            <a:extLst>
+              <a:ext uri="{FF2B5EF4-FFF2-40B4-BE49-F238E27FC236}">
+                <a16:creationId xmlns:a16="http://schemas.microsoft.com/office/drawing/2014/main" id="{BDD7FB80-442F-8E02-A018-E22CECD19765}"/>
+              </a:ext>
+            </a:extLst>
+          </p:cNvPr>
+          <p:cNvSpPr>
+            <a:spLocks noGrp="1"/>
+          </p:cNvSpPr>
+          <p:nvPr>
+            <p:ph idx="1"/>
+          </p:nvPr>
+        </p:nvSpPr>
+        <p:spPr/>
+        <p:txBody>
+          <a:bodyPr>
+            <a:normAutofit/>
+          </a:bodyPr>
+          <a:lstStyle/>
+          <a:p>
+            <a:pPr marL="0" indent="0">
+              <a:buNone/>
+            </a:pPr>
+            <a:endParaRPr lang="en-US" sz="3200" dirty="0"/>
+          </a:p>
+          <a:p>
+            <a:pPr marL="0" indent="0" algn="ctr">
+              <a:buNone/>
+            </a:pPr>
+            <a:r>
+              <a:rPr lang="en-US" sz="3200" dirty="0"/>
+              <a:t>“”</a:t>
+            </a:r>
+            <a:endParaRPr lang="nl-BE" sz="3200" dirty="0"/>
+          </a:p>
+        </p:txBody>
+      </p:sp>
+    </p:spTree>
+    <p:extLst>
+      <p:ext uri="{BB962C8B-B14F-4D97-AF65-F5344CB8AC3E}">
+        <p14:creationId xmlns:p14="http://schemas.microsoft.com/office/powerpoint/2010/main" val="3009680084"/>
+      </p:ext>
+    </p:extLst>
+  </p:cSld>
+  <p:clrMapOvr>
+    <a:masterClrMapping/>
+  </p:clrMapOvr>
+</p:sld>
+</file>
+
+<file path=ppt/slides/slide12.xml><?xml version="1.0" encoding="utf-8"?>
+<p:sld xmlns:a="http://schemas.openxmlformats.org/drawingml/2006/main" xmlns:r="http://schemas.openxmlformats.org/officeDocument/2006/relationships" xmlns:p="http://schemas.openxmlformats.org/presentationml/2006/main">
+  <p:cSld>
+    <p:spTree>
+      <p:nvGrpSpPr>
+        <p:cNvPr id="1" name=""/>
+        <p:cNvGrpSpPr/>
+        <p:nvPr/>
+      </p:nvGrpSpPr>
+      <p:grpSpPr>
+        <a:xfrm>
+          <a:off x="0" y="0"/>
+          <a:ext cx="0" cy="0"/>
+          <a:chOff x="0" y="0"/>
+          <a:chExt cx="0" cy="0"/>
+        </a:xfrm>
+      </p:grpSpPr>
+      <p:sp>
+        <p:nvSpPr>
+          <p:cNvPr id="2" name="Title 1">
+            <a:extLst>
+              <a:ext uri="{FF2B5EF4-FFF2-40B4-BE49-F238E27FC236}">
+                <a16:creationId xmlns:a16="http://schemas.microsoft.com/office/drawing/2014/main" id="{56EC1E37-7858-B586-CA01-05803A78AB6F}"/>
+              </a:ext>
+            </a:extLst>
+          </p:cNvPr>
+          <p:cNvSpPr>
+            <a:spLocks noGrp="1"/>
+          </p:cNvSpPr>
+          <p:nvPr>
+            <p:ph type="title"/>
+          </p:nvPr>
+        </p:nvSpPr>
+        <p:spPr/>
+        <p:txBody>
+          <a:bodyPr>
+            <a:normAutofit/>
+          </a:bodyPr>
+          <a:lstStyle/>
+          <a:p>
+            <a:r>
+              <a:rPr lang="en-US" dirty="0"/>
+              <a:t>Questions</a:t>
+            </a:r>
+            <a:endParaRPr lang="nl-BE" dirty="0"/>
+          </a:p>
+        </p:txBody>
+      </p:sp>
+      <p:sp>
+        <p:nvSpPr>
+          <p:cNvPr id="3" name="Content Placeholder 2">
+            <a:extLst>
+              <a:ext uri="{FF2B5EF4-FFF2-40B4-BE49-F238E27FC236}">
+                <a16:creationId xmlns:a16="http://schemas.microsoft.com/office/drawing/2014/main" id="{9A20A22F-3D48-E8F8-1358-7AFCAFDD9939}"/>
+              </a:ext>
+            </a:extLst>
+          </p:cNvPr>
+          <p:cNvSpPr>
+            <a:spLocks noGrp="1"/>
+          </p:cNvSpPr>
+          <p:nvPr>
+            <p:ph idx="1"/>
+          </p:nvPr>
+        </p:nvSpPr>
+        <p:spPr/>
+        <p:txBody>
+          <a:bodyPr/>
+          <a:lstStyle/>
+          <a:p>
+            <a:endParaRPr lang="en-US" dirty="0"/>
+          </a:p>
+          <a:p>
+            <a:endParaRPr lang="en-US" dirty="0"/>
+          </a:p>
+          <a:p>
+            <a:endParaRPr lang="en-US" dirty="0"/>
+          </a:p>
+        </p:txBody>
+      </p:sp>
+    </p:spTree>
+    <p:extLst>
+      <p:ext uri="{BB962C8B-B14F-4D97-AF65-F5344CB8AC3E}">
+        <p14:creationId xmlns:p14="http://schemas.microsoft.com/office/powerpoint/2010/main" val="808669256"/>
+      </p:ext>
+    </p:extLst>
+  </p:cSld>
+  <p:clrMapOvr>
+    <a:masterClrMapping/>
+  </p:clrMapOvr>
+</p:sld>
+</file>
+
 <file path=ppt/slides/slide2.xml><?xml version="1.0" encoding="utf-8"?>
 <p:sld xmlns:a="http://schemas.openxmlformats.org/drawingml/2006/main" xmlns:r="http://schemas.openxmlformats.org/officeDocument/2006/relationships" xmlns:p="http://schemas.openxmlformats.org/presentationml/2006/main">
   <p:cSld>
@@ -4501,6 +4789,18 @@
             </a:r>
           </a:p>
           <a:p>
+            <a:r>
+              <a:rPr lang="en-US" dirty="0"/>
+              <a:t>Linkers need to support this as well</a:t>
+            </a:r>
+          </a:p>
+          <a:p>
+            <a:r>
+              <a:rPr lang="en-US" dirty="0"/>
+              <a:t>“A fool's errand”</a:t>
+            </a:r>
+          </a:p>
+          <a:p>
             <a:endParaRPr lang="en-US" dirty="0"/>
           </a:p>
         </p:txBody>
@@ -4557,10 +4857,9 @@
           <a:lstStyle/>
           <a:p>
             <a:r>
-              <a:rPr lang="en-US" dirty="0"/>
-              <a:t>Summary</a:t>
-            </a:r>
-            <a:endParaRPr lang="nl-BE" dirty="0"/>
+              <a:rPr lang="nl-BE" dirty="0"/>
+              <a:t>How to fix?</a:t>
+            </a:r>
           </a:p>
         </p:txBody>
       </p:sp>
@@ -4587,20 +4886,104 @@
           </a:bodyPr>
           <a:lstStyle/>
           <a:p>
+            <a:r>
+              <a:rPr lang="en-US" dirty="0"/>
+              <a:t>Take your objects out of the global name space</a:t>
+            </a:r>
+          </a:p>
+          <a:p>
+            <a:r>
+              <a:rPr lang="en-US" dirty="0"/>
+              <a:t>Allow for scheduling of initialization</a:t>
+            </a:r>
+          </a:p>
+          <a:p>
+            <a:r>
+              <a:rPr lang="en-US" dirty="0"/>
+              <a:t>“Meyers Singleton”</a:t>
+            </a:r>
+          </a:p>
+          <a:p>
+            <a:r>
+              <a:rPr lang="en-US" dirty="0"/>
+              <a:t>Manager object is created after function call</a:t>
+            </a:r>
+          </a:p>
+          <a:p>
+            <a:r>
+              <a:rPr lang="en-US" dirty="0"/>
+              <a:t>Static data in local scope has different </a:t>
+            </a:r>
+            <a:r>
+              <a:rPr lang="en-US" dirty="0" err="1"/>
+              <a:t>init</a:t>
+            </a:r>
+            <a:r>
+              <a:rPr lang="en-US" dirty="0"/>
+              <a:t> rules</a:t>
+            </a:r>
+          </a:p>
+          <a:p>
+            <a:r>
+              <a:rPr lang="en-US" dirty="0"/>
+              <a:t>Initialization issues when multithreading?</a:t>
+            </a:r>
+          </a:p>
+          <a:p>
+            <a:pPr lvl="1"/>
+            <a:r>
+              <a:rPr lang="en-US" dirty="0"/>
+              <a:t>Thread safe (C++11)</a:t>
+            </a:r>
+          </a:p>
+          <a:p>
             <a:endParaRPr lang="en-US" dirty="0"/>
           </a:p>
-          <a:p>
-            <a:pPr marL="0" indent="0">
-              <a:buNone/>
-            </a:pPr>
-            <a:endParaRPr lang="en-US" dirty="0"/>
-          </a:p>
-        </p:txBody>
-      </p:sp>
+        </p:txBody>
+      </p:sp>
+      <p:pic>
+        <p:nvPicPr>
+          <p:cNvPr id="5" name="Picture 4">
+            <a:extLst>
+              <a:ext uri="{FF2B5EF4-FFF2-40B4-BE49-F238E27FC236}">
+                <a16:creationId xmlns:a16="http://schemas.microsoft.com/office/drawing/2014/main" id="{9180B930-7A6A-F83D-1055-F99C0DEF055C}"/>
+              </a:ext>
+            </a:extLst>
+          </p:cNvPr>
+          <p:cNvPicPr>
+            <a:picLocks noChangeAspect="1"/>
+          </p:cNvPicPr>
+          <p:nvPr/>
+        </p:nvPicPr>
+        <p:blipFill rotWithShape="1">
+          <a:blip r:embed="rId2"/>
+          <a:srcRect t="7303" r="18950" b="5058"/>
+          <a:stretch/>
+        </p:blipFill>
+        <p:spPr>
+          <a:xfrm>
+            <a:off x="7248128" y="2708920"/>
+            <a:ext cx="3312368" cy="1728192"/>
+          </a:xfrm>
+          <a:prstGeom prst="rect">
+            <a:avLst/>
+          </a:prstGeom>
+          <a:ln>
+            <a:noFill/>
+          </a:ln>
+          <a:effectLst>
+            <a:outerShdw blurRad="292100" dist="139700" dir="2700000" algn="tl" rotWithShape="0">
+              <a:srgbClr val="333333">
+                <a:alpha val="65000"/>
+              </a:srgbClr>
+            </a:outerShdw>
+          </a:effectLst>
+        </p:spPr>
+      </p:pic>
     </p:spTree>
     <p:extLst>
       <p:ext uri="{BB962C8B-B14F-4D97-AF65-F5344CB8AC3E}">
-        <p14:creationId xmlns:p14="http://schemas.microsoft.com/office/powerpoint/2010/main" val="1371427845"/>
+        <p14:creationId xmlns:p14="http://schemas.microsoft.com/office/powerpoint/2010/main" val="351036896"/>
       </p:ext>
     </p:extLst>
   </p:cSld>
@@ -4632,7 +5015,7 @@
           <p:cNvPr id="2" name="Title 1">
             <a:extLst>
               <a:ext uri="{FF2B5EF4-FFF2-40B4-BE49-F238E27FC236}">
-                <a16:creationId xmlns:a16="http://schemas.microsoft.com/office/drawing/2014/main" id="{31FED79A-01DE-CB7A-F0FF-EC4A8B17C7C0}"/>
+                <a16:creationId xmlns:a16="http://schemas.microsoft.com/office/drawing/2014/main" id="{836DA0B8-894A-0344-44A5-2ADF23E811BC}"/>
               </a:ext>
             </a:extLst>
           </p:cNvPr>
@@ -4649,10 +5032,9 @@
           <a:lstStyle/>
           <a:p>
             <a:r>
-              <a:rPr lang="en-US" dirty="0"/>
-              <a:t>Summary [155 &lt; 160char]</a:t>
-            </a:r>
-            <a:endParaRPr lang="nl-BE" dirty="0"/>
+              <a:rPr lang="nl-BE" dirty="0"/>
+              <a:t>Didn’t you just hide the singleton?</a:t>
+            </a:r>
           </a:p>
         </p:txBody>
       </p:sp>
@@ -4661,7 +5043,7 @@
           <p:cNvPr id="3" name="Content Placeholder 2">
             <a:extLst>
               <a:ext uri="{FF2B5EF4-FFF2-40B4-BE49-F238E27FC236}">
-                <a16:creationId xmlns:a16="http://schemas.microsoft.com/office/drawing/2014/main" id="{BDD7FB80-442F-8E02-A018-E22CECD19765}"/>
+                <a16:creationId xmlns:a16="http://schemas.microsoft.com/office/drawing/2014/main" id="{C74DED9C-A947-136E-D883-01C2B671B243}"/>
               </a:ext>
             </a:extLst>
           </p:cNvPr>
@@ -4679,27 +5061,58 @@
           </a:bodyPr>
           <a:lstStyle/>
           <a:p>
-            <a:pPr marL="0" indent="0">
-              <a:buNone/>
-            </a:pPr>
-            <a:endParaRPr lang="en-US" sz="3200" dirty="0"/>
-          </a:p>
-          <a:p>
-            <a:pPr marL="0" indent="0" algn="ctr">
-              <a:buNone/>
-            </a:pPr>
-            <a:r>
-              <a:rPr lang="en-US" sz="3200" dirty="0"/>
-              <a:t>“”</a:t>
-            </a:r>
-            <a:endParaRPr lang="nl-BE" sz="3200" dirty="0"/>
+            <a:r>
+              <a:rPr lang="en-US" dirty="0"/>
+              <a:t>Well, yes</a:t>
+            </a:r>
+          </a:p>
+          <a:p>
+            <a:r>
+              <a:rPr lang="en-US" dirty="0"/>
+              <a:t>Hiding singletons is easy</a:t>
+            </a:r>
+          </a:p>
+          <a:p>
+            <a:r>
+              <a:rPr lang="en-US" dirty="0"/>
+              <a:t>Enforcing non-use is very hard</a:t>
+            </a:r>
+          </a:p>
+          <a:p>
+            <a:r>
+              <a:rPr lang="en-US" dirty="0"/>
+              <a:t>Rat out the singletons</a:t>
+            </a:r>
+          </a:p>
+          <a:p>
+            <a:pPr lvl="1"/>
+            <a:r>
+              <a:rPr lang="en-US" dirty="0"/>
+              <a:t>Classes that contain the name “singleton”</a:t>
+            </a:r>
+          </a:p>
+          <a:p>
+            <a:pPr lvl="1"/>
+            <a:r>
+              <a:rPr lang="en-US" dirty="0"/>
+              <a:t>Classes that instantiate a single object</a:t>
+            </a:r>
+          </a:p>
+          <a:p>
+            <a:r>
+              <a:rPr lang="en-US" dirty="0"/>
+              <a:t>Consider this code snippet</a:t>
+            </a:r>
+          </a:p>
+          <a:p>
+            <a:endParaRPr lang="en-US" dirty="0"/>
           </a:p>
         </p:txBody>
       </p:sp>
     </p:spTree>
     <p:extLst>
       <p:ext uri="{BB962C8B-B14F-4D97-AF65-F5344CB8AC3E}">
-        <p14:creationId xmlns:p14="http://schemas.microsoft.com/office/powerpoint/2010/main" val="3009680084"/>
+        <p14:creationId xmlns:p14="http://schemas.microsoft.com/office/powerpoint/2010/main" val="364601241"/>
       </p:ext>
     </p:extLst>
   </p:cSld>
@@ -4731,7 +5144,7 @@
           <p:cNvPr id="2" name="Title 1">
             <a:extLst>
               <a:ext uri="{FF2B5EF4-FFF2-40B4-BE49-F238E27FC236}">
-                <a16:creationId xmlns:a16="http://schemas.microsoft.com/office/drawing/2014/main" id="{56EC1E37-7858-B586-CA01-05803A78AB6F}"/>
+                <a16:creationId xmlns:a16="http://schemas.microsoft.com/office/drawing/2014/main" id="{836DA0B8-894A-0344-44A5-2ADF23E811BC}"/>
               </a:ext>
             </a:extLst>
           </p:cNvPr>
@@ -4744,6 +5157,34 @@
         </p:nvSpPr>
         <p:spPr/>
         <p:txBody>
+          <a:bodyPr/>
+          <a:lstStyle/>
+          <a:p>
+            <a:r>
+              <a:rPr lang="nl-BE" dirty="0"/>
+              <a:t>Is this a singleton?</a:t>
+            </a:r>
+          </a:p>
+        </p:txBody>
+      </p:sp>
+      <p:sp>
+        <p:nvSpPr>
+          <p:cNvPr id="3" name="Content Placeholder 2">
+            <a:extLst>
+              <a:ext uri="{FF2B5EF4-FFF2-40B4-BE49-F238E27FC236}">
+                <a16:creationId xmlns:a16="http://schemas.microsoft.com/office/drawing/2014/main" id="{C74DED9C-A947-136E-D883-01C2B671B243}"/>
+              </a:ext>
+            </a:extLst>
+          </p:cNvPr>
+          <p:cNvSpPr>
+            <a:spLocks noGrp="1"/>
+          </p:cNvSpPr>
+          <p:nvPr>
+            <p:ph idx="1"/>
+          </p:nvPr>
+        </p:nvSpPr>
+        <p:spPr/>
+        <p:txBody>
           <a:bodyPr>
             <a:normAutofit/>
           </a:bodyPr>
@@ -4751,9 +5192,137 @@
           <a:p>
             <a:r>
               <a:rPr lang="en-US" dirty="0"/>
-              <a:t>Questions</a:t>
-            </a:r>
-            <a:endParaRPr lang="nl-BE" dirty="0"/>
+              <a:t>The main giveaway is the private constructor</a:t>
+            </a:r>
+          </a:p>
+          <a:p>
+            <a:r>
+              <a:rPr lang="en-US" dirty="0"/>
+              <a:t>Only a member or a friend can instantiate</a:t>
+            </a:r>
+          </a:p>
+          <a:p>
+            <a:pPr lvl="1"/>
+            <a:r>
+              <a:rPr lang="en-US" dirty="0"/>
+              <a:t>We see no friend declarations</a:t>
+            </a:r>
+          </a:p>
+          <a:p>
+            <a:r>
+              <a:rPr lang="en-US" dirty="0"/>
+              <a:t>Member function which returns a Manager&amp;!</a:t>
+            </a:r>
+          </a:p>
+          <a:p>
+            <a:r>
+              <a:rPr lang="en-US" dirty="0"/>
+              <a:t>100% Singleton</a:t>
+            </a:r>
+          </a:p>
+          <a:p>
+            <a:r>
+              <a:rPr lang="en-US" dirty="0"/>
+              <a:t>“Should we avoid all static storage duration objects?”</a:t>
+            </a:r>
+          </a:p>
+          <a:p>
+            <a:pPr lvl="1"/>
+            <a:r>
+              <a:rPr lang="en-US" dirty="0"/>
+              <a:t>Hold that thought</a:t>
+            </a:r>
+          </a:p>
+          <a:p>
+            <a:endParaRPr lang="en-US" dirty="0"/>
+          </a:p>
+        </p:txBody>
+      </p:sp>
+      <p:pic>
+        <p:nvPicPr>
+          <p:cNvPr id="9" name="Picture 8">
+            <a:extLst>
+              <a:ext uri="{FF2B5EF4-FFF2-40B4-BE49-F238E27FC236}">
+                <a16:creationId xmlns:a16="http://schemas.microsoft.com/office/drawing/2014/main" id="{BD239453-5E83-67EB-5203-829F15E85C1E}"/>
+              </a:ext>
+            </a:extLst>
+          </p:cNvPr>
+          <p:cNvPicPr>
+            <a:picLocks noChangeAspect="1"/>
+          </p:cNvPicPr>
+          <p:nvPr/>
+        </p:nvPicPr>
+        <p:blipFill>
+          <a:blip r:embed="rId2"/>
+          <a:stretch>
+            <a:fillRect/>
+          </a:stretch>
+        </p:blipFill>
+        <p:spPr>
+          <a:xfrm>
+            <a:off x="7896200" y="1825605"/>
+            <a:ext cx="3985639" cy="3091425"/>
+          </a:xfrm>
+          <a:prstGeom prst="rect">
+            <a:avLst/>
+          </a:prstGeom>
+        </p:spPr>
+      </p:pic>
+    </p:spTree>
+    <p:extLst>
+      <p:ext uri="{BB962C8B-B14F-4D97-AF65-F5344CB8AC3E}">
+        <p14:creationId xmlns:p14="http://schemas.microsoft.com/office/powerpoint/2010/main" val="1717680963"/>
+      </p:ext>
+    </p:extLst>
+  </p:cSld>
+  <p:clrMapOvr>
+    <a:masterClrMapping/>
+  </p:clrMapOvr>
+</p:sld>
+</file>
+
+<file path=ppt/slides/slide8.xml><?xml version="1.0" encoding="utf-8"?>
+<p:sld xmlns:a="http://schemas.openxmlformats.org/drawingml/2006/main" xmlns:r="http://schemas.openxmlformats.org/officeDocument/2006/relationships" xmlns:p="http://schemas.openxmlformats.org/presentationml/2006/main">
+  <p:cSld>
+    <p:spTree>
+      <p:nvGrpSpPr>
+        <p:cNvPr id="1" name=""/>
+        <p:cNvGrpSpPr/>
+        <p:nvPr/>
+      </p:nvGrpSpPr>
+      <p:grpSpPr>
+        <a:xfrm>
+          <a:off x="0" y="0"/>
+          <a:ext cx="0" cy="0"/>
+          <a:chOff x="0" y="0"/>
+          <a:chExt cx="0" cy="0"/>
+        </a:xfrm>
+      </p:grpSpPr>
+      <p:sp>
+        <p:nvSpPr>
+          <p:cNvPr id="2" name="Title 1">
+            <a:extLst>
+              <a:ext uri="{FF2B5EF4-FFF2-40B4-BE49-F238E27FC236}">
+                <a16:creationId xmlns:a16="http://schemas.microsoft.com/office/drawing/2014/main" id="{836DA0B8-894A-0344-44A5-2ADF23E811BC}"/>
+              </a:ext>
+            </a:extLst>
+          </p:cNvPr>
+          <p:cNvSpPr>
+            <a:spLocks noGrp="1"/>
+          </p:cNvSpPr>
+          <p:nvPr>
+            <p:ph type="title"/>
+          </p:nvPr>
+        </p:nvSpPr>
+        <p:spPr/>
+        <p:txBody>
+          <a:bodyPr/>
+          <a:lstStyle/>
+          <a:p>
+            <a:r>
+              <a:rPr lang="nl-BE" dirty="0"/>
+              <a:t>singletons, not Singletons</a:t>
+            </a:r>
           </a:p>
         </p:txBody>
       </p:sp>
@@ -4762,7 +5331,7 @@
           <p:cNvPr id="3" name="Content Placeholder 2">
             <a:extLst>
               <a:ext uri="{FF2B5EF4-FFF2-40B4-BE49-F238E27FC236}">
-                <a16:creationId xmlns:a16="http://schemas.microsoft.com/office/drawing/2014/main" id="{9A20A22F-3D48-E8F8-1358-7AFCAFDD9939}"/>
+                <a16:creationId xmlns:a16="http://schemas.microsoft.com/office/drawing/2014/main" id="{C74DED9C-A947-136E-D883-01C2B671B243}"/>
               </a:ext>
             </a:extLst>
           </p:cNvPr>
@@ -4775,23 +5344,232 @@
         </p:nvSpPr>
         <p:spPr/>
         <p:txBody>
-          <a:bodyPr/>
-          <a:lstStyle/>
+          <a:bodyPr>
+            <a:normAutofit/>
+          </a:bodyPr>
+          <a:lstStyle/>
+          <a:p>
+            <a:r>
+              <a:rPr lang="en-US" dirty="0"/>
+              <a:t>A class with static data and member functions</a:t>
+            </a:r>
+          </a:p>
+          <a:p>
+            <a:pPr lvl="1"/>
+            <a:r>
+              <a:rPr lang="en-US" dirty="0"/>
+              <a:t>Why though?</a:t>
+            </a:r>
+          </a:p>
+          <a:p>
+            <a:r>
+              <a:rPr lang="en-US" dirty="0"/>
+              <a:t>Overly convoluted</a:t>
+            </a:r>
+          </a:p>
+          <a:p>
+            <a:r>
+              <a:rPr lang="en-US" dirty="0"/>
+              <a:t>Put it in a namespace</a:t>
+            </a:r>
+          </a:p>
+          <a:p>
+            <a:r>
+              <a:rPr lang="en-US" dirty="0"/>
+              <a:t>Does not need to be exposed</a:t>
+            </a:r>
+          </a:p>
+          <a:p>
+            <a:r>
+              <a:rPr lang="en-US" dirty="0"/>
+              <a:t>It can be hidden in an implementation file</a:t>
+            </a:r>
+          </a:p>
+          <a:p>
+            <a:r>
+              <a:rPr lang="en-US" dirty="0"/>
+              <a:t>Might still be prone to SIOF</a:t>
+            </a:r>
+          </a:p>
+          <a:p>
+            <a:pPr lvl="1"/>
+            <a:r>
+              <a:rPr lang="en-US" dirty="0"/>
+              <a:t>Static initialization order fiasco</a:t>
+            </a:r>
+          </a:p>
           <a:p>
             <a:endParaRPr lang="en-US" dirty="0"/>
           </a:p>
-          <a:p>
-            <a:endParaRPr lang="en-US" dirty="0"/>
-          </a:p>
-          <a:p>
-            <a:endParaRPr lang="en-US" dirty="0"/>
-          </a:p>
-        </p:txBody>
-      </p:sp>
+        </p:txBody>
+      </p:sp>
+      <p:pic>
+        <p:nvPicPr>
+          <p:cNvPr id="5" name="Picture 4">
+            <a:extLst>
+              <a:ext uri="{FF2B5EF4-FFF2-40B4-BE49-F238E27FC236}">
+                <a16:creationId xmlns:a16="http://schemas.microsoft.com/office/drawing/2014/main" id="{362F207C-4910-DC92-8A49-A50A43BB1FAF}"/>
+              </a:ext>
+            </a:extLst>
+          </p:cNvPr>
+          <p:cNvPicPr>
+            <a:picLocks noChangeAspect="1"/>
+          </p:cNvPicPr>
+          <p:nvPr/>
+        </p:nvPicPr>
+        <p:blipFill>
+          <a:blip r:embed="rId2"/>
+          <a:stretch>
+            <a:fillRect/>
+          </a:stretch>
+        </p:blipFill>
+        <p:spPr>
+          <a:xfrm>
+            <a:off x="7032104" y="1828800"/>
+            <a:ext cx="4392488" cy="2435559"/>
+          </a:xfrm>
+          <a:prstGeom prst="rect">
+            <a:avLst/>
+          </a:prstGeom>
+        </p:spPr>
+      </p:pic>
+      <p:pic>
+        <p:nvPicPr>
+          <p:cNvPr id="7" name="Picture 6">
+            <a:extLst>
+              <a:ext uri="{FF2B5EF4-FFF2-40B4-BE49-F238E27FC236}">
+                <a16:creationId xmlns:a16="http://schemas.microsoft.com/office/drawing/2014/main" id="{3CAB8B99-A1B7-D629-52EF-B97C2AFB641E}"/>
+              </a:ext>
+            </a:extLst>
+          </p:cNvPr>
+          <p:cNvPicPr>
+            <a:picLocks noChangeAspect="1"/>
+          </p:cNvPicPr>
+          <p:nvPr/>
+        </p:nvPicPr>
+        <p:blipFill>
+          <a:blip r:embed="rId3"/>
+          <a:stretch>
+            <a:fillRect/>
+          </a:stretch>
+        </p:blipFill>
+        <p:spPr>
+          <a:xfrm>
+            <a:off x="6888088" y="4437112"/>
+            <a:ext cx="4689075" cy="1422309"/>
+          </a:xfrm>
+          <a:prstGeom prst="rect">
+            <a:avLst/>
+          </a:prstGeom>
+        </p:spPr>
+      </p:pic>
     </p:spTree>
     <p:extLst>
       <p:ext uri="{BB962C8B-B14F-4D97-AF65-F5344CB8AC3E}">
-        <p14:creationId xmlns:p14="http://schemas.microsoft.com/office/powerpoint/2010/main" val="808669256"/>
+        <p14:creationId xmlns:p14="http://schemas.microsoft.com/office/powerpoint/2010/main" val="884554183"/>
+      </p:ext>
+    </p:extLst>
+  </p:cSld>
+  <p:clrMapOvr>
+    <a:masterClrMapping/>
+  </p:clrMapOvr>
+</p:sld>
+</file>
+
+<file path=ppt/slides/slide9.xml><?xml version="1.0" encoding="utf-8"?>
+<p:sld xmlns:a="http://schemas.openxmlformats.org/drawingml/2006/main" xmlns:r="http://schemas.openxmlformats.org/officeDocument/2006/relationships" xmlns:p="http://schemas.openxmlformats.org/presentationml/2006/main">
+  <p:cSld>
+    <p:spTree>
+      <p:nvGrpSpPr>
+        <p:cNvPr id="1" name=""/>
+        <p:cNvGrpSpPr/>
+        <p:nvPr/>
+      </p:nvGrpSpPr>
+      <p:grpSpPr>
+        <a:xfrm>
+          <a:off x="0" y="0"/>
+          <a:ext cx="0" cy="0"/>
+          <a:chOff x="0" y="0"/>
+          <a:chExt cx="0" cy="0"/>
+        </a:xfrm>
+      </p:grpSpPr>
+      <p:sp>
+        <p:nvSpPr>
+          <p:cNvPr id="2" name="Title 1">
+            <a:extLst>
+              <a:ext uri="{FF2B5EF4-FFF2-40B4-BE49-F238E27FC236}">
+                <a16:creationId xmlns:a16="http://schemas.microsoft.com/office/drawing/2014/main" id="{836DA0B8-894A-0344-44A5-2ADF23E811BC}"/>
+              </a:ext>
+            </a:extLst>
+          </p:cNvPr>
+          <p:cNvSpPr>
+            <a:spLocks noGrp="1"/>
+          </p:cNvSpPr>
+          <p:nvPr>
+            <p:ph type="title"/>
+          </p:nvPr>
+        </p:nvSpPr>
+        <p:spPr/>
+        <p:txBody>
+          <a:bodyPr/>
+          <a:lstStyle/>
+          <a:p>
+            <a:r>
+              <a:rPr lang="nl-BE" dirty="0"/>
+              <a:t>Isn’t this just a singleton</a:t>
+            </a:r>
+          </a:p>
+        </p:txBody>
+      </p:sp>
+      <p:sp>
+        <p:nvSpPr>
+          <p:cNvPr id="3" name="Content Placeholder 2">
+            <a:extLst>
+              <a:ext uri="{FF2B5EF4-FFF2-40B4-BE49-F238E27FC236}">
+                <a16:creationId xmlns:a16="http://schemas.microsoft.com/office/drawing/2014/main" id="{C74DED9C-A947-136E-D883-01C2B671B243}"/>
+              </a:ext>
+            </a:extLst>
+          </p:cNvPr>
+          <p:cNvSpPr>
+            <a:spLocks noGrp="1"/>
+          </p:cNvSpPr>
+          <p:nvPr>
+            <p:ph idx="1"/>
+          </p:nvPr>
+        </p:nvSpPr>
+        <p:spPr/>
+        <p:txBody>
+          <a:bodyPr>
+            <a:normAutofit/>
+          </a:bodyPr>
+          <a:lstStyle/>
+          <a:p>
+            <a:r>
+              <a:rPr lang="en-US" dirty="0"/>
+              <a:t>It is</a:t>
+            </a:r>
+          </a:p>
+          <a:p>
+            <a:r>
+              <a:rPr lang="en-US" dirty="0"/>
+              <a:t>“Avoid Singletons”, the pattern</a:t>
+            </a:r>
+          </a:p>
+          <a:p>
+            <a:r>
+              <a:rPr lang="en-US" dirty="0"/>
+              <a:t>Not the single-instance abstraction</a:t>
+            </a:r>
+          </a:p>
+          <a:p>
+            <a:endParaRPr lang="en-US" dirty="0"/>
+          </a:p>
+        </p:txBody>
+      </p:sp>
+    </p:spTree>
+    <p:extLst>
+      <p:ext uri="{BB962C8B-B14F-4D97-AF65-F5344CB8AC3E}">
+        <p14:creationId xmlns:p14="http://schemas.microsoft.com/office/powerpoint/2010/main" val="3492080156"/>
       </p:ext>
     </p:extLst>
   </p:cSld>
@@ -5585,6 +6363,30 @@
 </file>
 
 <file path=customXml/item1.xml><?xml version="1.0" encoding="utf-8"?>
+<?mso-contentType ?>
+<FormTemplates xmlns="http://schemas.microsoft.com/sharepoint/v3/contenttype/forms">
+  <Display>DocumentLibraryForm</Display>
+  <Edit>DocumentLibraryForm</Edit>
+  <New>DocumentLibraryForm</New>
+</FormTemplates>
+</file>
+
+<file path=customXml/item2.xml><?xml version="1.0" encoding="utf-8"?>
+<p:properties xmlns:p="http://schemas.microsoft.com/office/2006/metadata/properties" xmlns:xsi="http://www.w3.org/2001/XMLSchema-instance" xmlns:pc="http://schemas.microsoft.com/office/infopath/2007/PartnerControls">
+  <documentManagement>
+    <lcf76f155ced4ddcb4097134ff3c332f xmlns="60eb0cf4-ae2a-4762-800a-cb593b869ecb">
+      <Terms xmlns="http://schemas.microsoft.com/office/infopath/2007/PartnerControls"/>
+    </lcf76f155ced4ddcb4097134ff3c332f>
+    <IconOverlay xmlns="http://schemas.microsoft.com/sharepoint/v4" xsi:nil="true"/>
+    <TaxCatchAll xmlns="128482ec-0431-40d5-ab26-89ea2a4f3ccd" xsi:nil="true"/>
+    <m99485b88215436a82099f8287cba0b0 xmlns="128482ec-0431-40d5-ab26-89ea2a4f3ccd">
+      <Terms xmlns="http://schemas.microsoft.com/office/infopath/2007/PartnerControls"/>
+    </m99485b88215436a82099f8287cba0b0>
+  </documentManagement>
+</p:properties>
+</file>
+
+<file path=customXml/item3.xml><?xml version="1.0" encoding="utf-8"?>
 <ct:contentTypeSchema xmlns:ct="http://schemas.microsoft.com/office/2006/metadata/contentType" xmlns:ma="http://schemas.microsoft.com/office/2006/metadata/properties/metaAttributes" ct:_="" ma:_="" ma:contentTypeName="Document" ma:contentTypeID="0x010100723942CCEB3A674D8F1F6472CCEFB38E" ma:contentTypeVersion="12" ma:contentTypeDescription="Create a new document." ma:contentTypeScope="" ma:versionID="f7d503e4e5f2150aa73d4fab685f27ad">
   <xsd:schema xmlns:xsd="http://www.w3.org/2001/XMLSchema" xmlns:xs="http://www.w3.org/2001/XMLSchema" xmlns:p="http://schemas.microsoft.com/office/2006/metadata/properties" xmlns:ns2="128482ec-0431-40d5-ab26-89ea2a4f3ccd" xmlns:ns3="60eb0cf4-ae2a-4762-800a-cb593b869ecb" xmlns:ns4="http://schemas.microsoft.com/sharepoint/v4" xmlns:ns5="a2e691a9-fcfc-4d85-a390-1894fe98bd9e" targetNamespace="http://schemas.microsoft.com/office/2006/metadata/properties" ma:root="true" ma:fieldsID="cdaef380ec0413f963fceb43e408d365" ns2:_="" ns3:_="" ns4:_="" ns5:_="">
     <xsd:import namespace="128482ec-0431-40d5-ab26-89ea2a4f3ccd"/>
@@ -5863,31 +6665,27 @@
 </ct:contentTypeSchema>
 </file>
 
-<file path=customXml/item2.xml><?xml version="1.0" encoding="utf-8"?>
-<p:properties xmlns:p="http://schemas.microsoft.com/office/2006/metadata/properties" xmlns:xsi="http://www.w3.org/2001/XMLSchema-instance" xmlns:pc="http://schemas.microsoft.com/office/infopath/2007/PartnerControls">
-  <documentManagement>
-    <lcf76f155ced4ddcb4097134ff3c332f xmlns="60eb0cf4-ae2a-4762-800a-cb593b869ecb">
-      <Terms xmlns="http://schemas.microsoft.com/office/infopath/2007/PartnerControls"/>
-    </lcf76f155ced4ddcb4097134ff3c332f>
-    <IconOverlay xmlns="http://schemas.microsoft.com/sharepoint/v4" xsi:nil="true"/>
-    <TaxCatchAll xmlns="128482ec-0431-40d5-ab26-89ea2a4f3ccd" xsi:nil="true"/>
-    <m99485b88215436a82099f8287cba0b0 xmlns="128482ec-0431-40d5-ab26-89ea2a4f3ccd">
-      <Terms xmlns="http://schemas.microsoft.com/office/infopath/2007/PartnerControls"/>
-    </m99485b88215436a82099f8287cba0b0>
-  </documentManagement>
-</p:properties>
+<file path=customXml/itemProps1.xml><?xml version="1.0" encoding="utf-8"?>
+<ds:datastoreItem xmlns:ds="http://schemas.openxmlformats.org/officeDocument/2006/customXml" ds:itemID="{2D249758-9633-43E2-B21C-3D93EE8C5DA1}">
+  <ds:schemaRefs>
+    <ds:schemaRef ds:uri="http://schemas.microsoft.com/sharepoint/v3/contenttype/forms"/>
+  </ds:schemaRefs>
+</ds:datastoreItem>
 </file>
 
-<file path=customXml/item3.xml><?xml version="1.0" encoding="utf-8"?>
-<?mso-contentType ?>
-<FormTemplates xmlns="http://schemas.microsoft.com/sharepoint/v3/contenttype/forms">
-  <Display>DocumentLibraryForm</Display>
-  <Edit>DocumentLibraryForm</Edit>
-  <New>DocumentLibraryForm</New>
-</FormTemplates>
+<file path=customXml/itemProps2.xml><?xml version="1.0" encoding="utf-8"?>
+<ds:datastoreItem xmlns:ds="http://schemas.openxmlformats.org/officeDocument/2006/customXml" ds:itemID="{59359FEE-EE2A-4F2D-A45F-DFDF5ED95444}">
+  <ds:schemaRefs>
+    <ds:schemaRef ds:uri="http://schemas.microsoft.com/office/2006/metadata/properties"/>
+    <ds:schemaRef ds:uri="http://schemas.microsoft.com/office/infopath/2007/PartnerControls"/>
+    <ds:schemaRef ds:uri="60eb0cf4-ae2a-4762-800a-cb593b869ecb"/>
+    <ds:schemaRef ds:uri="http://schemas.microsoft.com/sharepoint/v4"/>
+    <ds:schemaRef ds:uri="128482ec-0431-40d5-ab26-89ea2a4f3ccd"/>
+  </ds:schemaRefs>
+</ds:datastoreItem>
 </file>
 
-<file path=customXml/itemProps1.xml><?xml version="1.0" encoding="utf-8"?>
+<file path=customXml/itemProps3.xml><?xml version="1.0" encoding="utf-8"?>
 <ds:datastoreItem xmlns:ds="http://schemas.openxmlformats.org/officeDocument/2006/customXml" ds:itemID="{EDF218E0-BDAF-4F27-A5F6-FDBA0507EB21}">
   <ds:schemaRefs>
     <ds:schemaRef ds:uri="http://schemas.microsoft.com/office/2006/metadata/contentType"/>
@@ -5906,24 +6704,4 @@
     <ds:schemaRef ds:uri="http://schemas.microsoft.com/internal/obd"/>
   </ds:schemaRefs>
 </ds:datastoreItem>
-</file>
-
-<file path=customXml/itemProps2.xml><?xml version="1.0" encoding="utf-8"?>
-<ds:datastoreItem xmlns:ds="http://schemas.openxmlformats.org/officeDocument/2006/customXml" ds:itemID="{59359FEE-EE2A-4F2D-A45F-DFDF5ED95444}">
-  <ds:schemaRefs>
-    <ds:schemaRef ds:uri="http://schemas.microsoft.com/office/2006/metadata/properties"/>
-    <ds:schemaRef ds:uri="http://schemas.microsoft.com/office/infopath/2007/PartnerControls"/>
-    <ds:schemaRef ds:uri="60eb0cf4-ae2a-4762-800a-cb593b869ecb"/>
-    <ds:schemaRef ds:uri="http://schemas.microsoft.com/sharepoint/v4"/>
-    <ds:schemaRef ds:uri="128482ec-0431-40d5-ab26-89ea2a4f3ccd"/>
-  </ds:schemaRefs>
-</ds:datastoreItem>
-</file>
-
-<file path=customXml/itemProps3.xml><?xml version="1.0" encoding="utf-8"?>
-<ds:datastoreItem xmlns:ds="http://schemas.openxmlformats.org/officeDocument/2006/customXml" ds:itemID="{2D249758-9633-43E2-B21C-3D93EE8C5DA1}">
-  <ds:schemaRefs>
-    <ds:schemaRef ds:uri="http://schemas.microsoft.com/sharepoint/v3/contenttype/forms"/>
-  </ds:schemaRefs>
-</ds:datastoreItem>
 </file>
</xml_diff>

<commit_message>
added some questions and the little summary
answers on question are in the comments
</commit_message>
<xml_diff>
--- a/Beautiful C++ ch3-2 I.3.pptx
+++ b/Beautiful C++ ch3-2 I.3.pptx
@@ -225,7 +225,7 @@
           <a:p>
             <a:fld id="{762B48F5-BACC-47D6-A0F7-82FBF9C6BC85}" type="datetimeFigureOut">
               <a:rPr lang="en-US"/>
-              <a:t>4/18/2024</a:t>
+              <a:t>4/20/2024</a:t>
             </a:fld>
             <a:endParaRPr/>
           </a:p>
@@ -390,7 +390,7 @@
           <a:p>
             <a:fld id="{0CB1CD00-5424-4675-AB18-2C419B060449}" type="datetimeFigureOut">
               <a:rPr lang="en-US"/>
-              <a:t>4/18/2024</a:t>
+              <a:t>4/20/2024</a:t>
             </a:fld>
             <a:endParaRPr/>
           </a:p>
@@ -868,6 +868,63 @@
           <a:bodyPr/>
           <a:lstStyle/>
           <a:p>
+            <a:r>
+              <a:rPr lang="en-US" dirty="0"/>
+              <a:t>Singleton is the pattern that ensures a class only has one instance and provides an access point to that instance</a:t>
+            </a:r>
+          </a:p>
+          <a:p>
+            <a:r>
+              <a:rPr lang="en-US" dirty="0"/>
+              <a:t>singleton refers to the instance itself of that class.</a:t>
+            </a:r>
+          </a:p>
+          <a:p>
+            <a:endParaRPr lang="en-US" dirty="0"/>
+          </a:p>
+          <a:p>
+            <a:r>
+              <a:rPr lang="en-US" dirty="0"/>
+              <a:t>SIOF = Static </a:t>
+            </a:r>
+            <a:r>
+              <a:rPr lang="en-US" dirty="0" err="1"/>
+              <a:t>Initialzation</a:t>
+            </a:r>
+            <a:r>
+              <a:rPr lang="en-US" dirty="0"/>
+              <a:t> Order Fiasco</a:t>
+            </a:r>
+          </a:p>
+          <a:p>
+            <a:r>
+              <a:rPr lang="en-US" dirty="0"/>
+              <a:t>The order where static variable are initialized is </a:t>
+            </a:r>
+            <a:r>
+              <a:rPr lang="en-US"/>
+              <a:t>not set, so </a:t>
+            </a:r>
+            <a:r>
+              <a:rPr lang="en-US" dirty="0"/>
+              <a:t>when one static variable is dependent on another static variable, it can cause unpredictable </a:t>
+            </a:r>
+            <a:r>
+              <a:rPr lang="en-US" dirty="0" err="1"/>
+              <a:t>behaviour</a:t>
+            </a:r>
+            <a:r>
+              <a:rPr lang="en-US" dirty="0"/>
+              <a:t>, bugs and even crashes.</a:t>
+            </a:r>
+          </a:p>
+          <a:p>
+            <a:endParaRPr lang="en-US" dirty="0"/>
+          </a:p>
+          <a:p>
+            <a:endParaRPr lang="en-US" dirty="0"/>
+          </a:p>
+          <a:p>
             <a:endParaRPr lang="en-BE" dirty="0"/>
           </a:p>
         </p:txBody>
@@ -1291,7 +1348,7 @@
           <a:p>
             <a:fld id="{37CC0096-1860-4642-9CD2-0079EA5E7CD1}" type="datetimeFigureOut">
               <a:rPr lang="en-US" smtClean="0"/>
-              <a:t>4/18/2024</a:t>
+              <a:t>4/20/2024</a:t>
             </a:fld>
             <a:endParaRPr lang="en-US"/>
           </a:p>
@@ -1470,7 +1527,7 @@
           <a:p>
             <a:fld id="{37CC0096-1860-4642-9CD2-0079EA5E7CD1}" type="datetimeFigureOut">
               <a:rPr lang="en-US" smtClean="0"/>
-              <a:t>4/18/2024</a:t>
+              <a:t>4/20/2024</a:t>
             </a:fld>
             <a:endParaRPr lang="en-US"/>
           </a:p>
@@ -1643,7 +1700,7 @@
           <a:p>
             <a:fld id="{37CC0096-1860-4642-9CD2-0079EA5E7CD1}" type="datetimeFigureOut">
               <a:rPr lang="en-US" smtClean="0"/>
-              <a:t>4/18/2024</a:t>
+              <a:t>4/20/2024</a:t>
             </a:fld>
             <a:endParaRPr lang="en-US"/>
           </a:p>
@@ -2076,7 +2133,7 @@
           <a:p>
             <a:fld id="{37CC0096-1860-4642-9CD2-0079EA5E7CD1}" type="datetimeFigureOut">
               <a:rPr lang="en-US" smtClean="0"/>
-              <a:t>4/18/2024</a:t>
+              <a:t>4/20/2024</a:t>
             </a:fld>
             <a:endParaRPr lang="en-US"/>
           </a:p>
@@ -2515,7 +2572,7 @@
           <a:p>
             <a:fld id="{37CC0096-1860-4642-9CD2-0079EA5E7CD1}" type="datetimeFigureOut">
               <a:rPr lang="en-US" smtClean="0"/>
-              <a:t>4/18/2024</a:t>
+              <a:t>4/20/2024</a:t>
             </a:fld>
             <a:endParaRPr lang="en-US"/>
           </a:p>
@@ -2632,7 +2689,7 @@
           <a:p>
             <a:fld id="{37CC0096-1860-4642-9CD2-0079EA5E7CD1}" type="datetimeFigureOut">
               <a:rPr lang="en-US" smtClean="0"/>
-              <a:t>4/18/2024</a:t>
+              <a:t>4/20/2024</a:t>
             </a:fld>
             <a:endParaRPr lang="en-US"/>
           </a:p>
@@ -2727,7 +2784,7 @@
           <a:p>
             <a:fld id="{37CC0096-1860-4642-9CD2-0079EA5E7CD1}" type="datetimeFigureOut">
               <a:rPr lang="en-US" smtClean="0"/>
-              <a:t>4/18/2024</a:t>
+              <a:t>4/20/2024</a:t>
             </a:fld>
             <a:endParaRPr lang="en-US"/>
           </a:p>
@@ -3011,7 +3068,7 @@
           <a:p>
             <a:fld id="{37CC0096-1860-4642-9CD2-0079EA5E7CD1}" type="datetimeFigureOut">
               <a:rPr lang="en-US" smtClean="0"/>
-              <a:t>4/18/2024</a:t>
+              <a:t>4/20/2024</a:t>
             </a:fld>
             <a:endParaRPr lang="en-US"/>
           </a:p>
@@ -3322,7 +3379,7 @@
           <a:p>
             <a:fld id="{37CC0096-1860-4642-9CD2-0079EA5E7CD1}" type="datetimeFigureOut">
               <a:rPr lang="en-US" smtClean="0"/>
-              <a:t>4/18/2024</a:t>
+              <a:t>4/20/2024</a:t>
             </a:fld>
             <a:endParaRPr lang="en-US"/>
           </a:p>
@@ -3554,7 +3611,7 @@
             <a:fld id="{37CC0096-1860-4642-9CD2-0079EA5E7CD1}" type="datetimeFigureOut">
               <a:rPr lang="en-US" smtClean="0"/>
               <a:pPr/>
-              <a:t>4/18/2024</a:t>
+              <a:t>4/20/2024</a:t>
             </a:fld>
             <a:endParaRPr lang="en-US"/>
           </a:p>
@@ -4187,13 +4244,22 @@
           </a:bodyPr>
           <a:lstStyle/>
           <a:p>
-            <a:endParaRPr lang="en-US" dirty="0"/>
-          </a:p>
-          <a:p>
-            <a:pPr marL="0" indent="0">
-              <a:buNone/>
-            </a:pPr>
-            <a:endParaRPr lang="en-US" dirty="0"/>
+            <a:r>
+              <a:rPr lang="en-US" dirty="0"/>
+              <a:t>Avoid singletons: the pattern, not the abstraction.</a:t>
+            </a:r>
+          </a:p>
+          <a:p>
+            <a:r>
+              <a:rPr lang="en-US" dirty="0"/>
+              <a:t>Prefer using a namespace over a class to model this type of abstraction.</a:t>
+            </a:r>
+          </a:p>
+          <a:p>
+            <a:r>
+              <a:rPr lang="en-US" dirty="0"/>
+              <a:t>Use static data carefully when implementing a singleton.</a:t>
+            </a:r>
           </a:p>
         </p:txBody>
       </p:sp>
@@ -4378,7 +4444,16 @@
           <a:bodyPr/>
           <a:lstStyle/>
           <a:p>
-            <a:endParaRPr lang="en-US" dirty="0"/>
+            <a:r>
+              <a:rPr lang="en-US" dirty="0"/>
+              <a:t>What is the difference between Singleton and singleton?</a:t>
+            </a:r>
+          </a:p>
+          <a:p>
+            <a:r>
+              <a:rPr lang="en-US" dirty="0"/>
+              <a:t>What does SIOF refer to (Static Initialization Order Fiasco)?</a:t>
+            </a:r>
           </a:p>
           <a:p>
             <a:endParaRPr lang="en-US" dirty="0"/>
@@ -5435,10 +5510,10 @@
       </p:pic>
       <p:pic>
         <p:nvPicPr>
-          <p:cNvPr id="7" name="Picture 6">
+          <p:cNvPr id="6" name="Picture 5">
             <a:extLst>
               <a:ext uri="{FF2B5EF4-FFF2-40B4-BE49-F238E27FC236}">
-                <a16:creationId xmlns:a16="http://schemas.microsoft.com/office/drawing/2014/main" id="{3CAB8B99-A1B7-D629-52EF-B97C2AFB641E}"/>
+                <a16:creationId xmlns:a16="http://schemas.microsoft.com/office/drawing/2014/main" id="{62AE13E5-8837-5FAE-A37F-11253863C87A}"/>
               </a:ext>
             </a:extLst>
           </p:cNvPr>
@@ -5455,8 +5530,8 @@
         </p:blipFill>
         <p:spPr>
           <a:xfrm>
-            <a:off x="6888088" y="4437112"/>
-            <a:ext cx="4689075" cy="1422309"/>
+            <a:off x="7728376" y="4439243"/>
+            <a:ext cx="3696216" cy="1428949"/>
           </a:xfrm>
           <a:prstGeom prst="rect">
             <a:avLst/>
@@ -6363,15 +6438,6 @@
 </file>
 
 <file path=customXml/item1.xml><?xml version="1.0" encoding="utf-8"?>
-<?mso-contentType ?>
-<FormTemplates xmlns="http://schemas.microsoft.com/sharepoint/v3/contenttype/forms">
-  <Display>DocumentLibraryForm</Display>
-  <Edit>DocumentLibraryForm</Edit>
-  <New>DocumentLibraryForm</New>
-</FormTemplates>
-</file>
-
-<file path=customXml/item2.xml><?xml version="1.0" encoding="utf-8"?>
 <p:properties xmlns:p="http://schemas.microsoft.com/office/2006/metadata/properties" xmlns:xsi="http://www.w3.org/2001/XMLSchema-instance" xmlns:pc="http://schemas.microsoft.com/office/infopath/2007/PartnerControls">
   <documentManagement>
     <lcf76f155ced4ddcb4097134ff3c332f xmlns="60eb0cf4-ae2a-4762-800a-cb593b869ecb">
@@ -6384,6 +6450,15 @@
     </m99485b88215436a82099f8287cba0b0>
   </documentManagement>
 </p:properties>
+</file>
+
+<file path=customXml/item2.xml><?xml version="1.0" encoding="utf-8"?>
+<?mso-contentType ?>
+<FormTemplates xmlns="http://schemas.microsoft.com/sharepoint/v3/contenttype/forms">
+  <Display>DocumentLibraryForm</Display>
+  <Edit>DocumentLibraryForm</Edit>
+  <New>DocumentLibraryForm</New>
+</FormTemplates>
 </file>
 
 <file path=customXml/item3.xml><?xml version="1.0" encoding="utf-8"?>
@@ -6666,14 +6741,6 @@
 </file>
 
 <file path=customXml/itemProps1.xml><?xml version="1.0" encoding="utf-8"?>
-<ds:datastoreItem xmlns:ds="http://schemas.openxmlformats.org/officeDocument/2006/customXml" ds:itemID="{2D249758-9633-43E2-B21C-3D93EE8C5DA1}">
-  <ds:schemaRefs>
-    <ds:schemaRef ds:uri="http://schemas.microsoft.com/sharepoint/v3/contenttype/forms"/>
-  </ds:schemaRefs>
-</ds:datastoreItem>
-</file>
-
-<file path=customXml/itemProps2.xml><?xml version="1.0" encoding="utf-8"?>
 <ds:datastoreItem xmlns:ds="http://schemas.openxmlformats.org/officeDocument/2006/customXml" ds:itemID="{59359FEE-EE2A-4F2D-A45F-DFDF5ED95444}">
   <ds:schemaRefs>
     <ds:schemaRef ds:uri="http://schemas.microsoft.com/office/2006/metadata/properties"/>
@@ -6681,6 +6748,14 @@
     <ds:schemaRef ds:uri="60eb0cf4-ae2a-4762-800a-cb593b869ecb"/>
     <ds:schemaRef ds:uri="http://schemas.microsoft.com/sharepoint/v4"/>
     <ds:schemaRef ds:uri="128482ec-0431-40d5-ab26-89ea2a4f3ccd"/>
+  </ds:schemaRefs>
+</ds:datastoreItem>
+</file>
+
+<file path=customXml/itemProps2.xml><?xml version="1.0" encoding="utf-8"?>
+<ds:datastoreItem xmlns:ds="http://schemas.openxmlformats.org/officeDocument/2006/customXml" ds:itemID="{2D249758-9633-43E2-B21C-3D93EE8C5DA1}">
+  <ds:schemaRefs>
+    <ds:schemaRef ds:uri="http://schemas.microsoft.com/sharepoint/v3/contenttype/forms"/>
   </ds:schemaRefs>
 </ds:datastoreItem>
 </file>

</xml_diff>

<commit_message>
Chore/Adjusted final slide, added summary
</commit_message>
<xml_diff>
--- a/Beautiful C++ ch3-2 I.3.pptx
+++ b/Beautiful C++ ch3-2 I.3.pptx
@@ -868,6 +868,90 @@
           <a:bodyPr/>
           <a:lstStyle/>
           <a:p>
+            <a:endParaRPr lang="en-BE" dirty="0"/>
+          </a:p>
+        </p:txBody>
+      </p:sp>
+      <p:sp>
+        <p:nvSpPr>
+          <p:cNvPr id="4" name="Slide Number Placeholder 3"/>
+          <p:cNvSpPr>
+            <a:spLocks noGrp="1"/>
+          </p:cNvSpPr>
+          <p:nvPr>
+            <p:ph type="sldNum" sz="quarter" idx="5"/>
+          </p:nvPr>
+        </p:nvSpPr>
+        <p:spPr/>
+        <p:txBody>
+          <a:bodyPr/>
+          <a:lstStyle/>
+          <a:p>
+            <a:fld id="{5EE2CF44-2B13-41B4-A334-1CDF534EEBBF}" type="slidenum">
+              <a:rPr lang="en-BE" smtClean="0"/>
+              <a:t>8</a:t>
+            </a:fld>
+            <a:endParaRPr lang="en-BE"/>
+          </a:p>
+        </p:txBody>
+      </p:sp>
+    </p:spTree>
+    <p:extLst>
+      <p:ext uri="{BB962C8B-B14F-4D97-AF65-F5344CB8AC3E}">
+        <p14:creationId xmlns:p14="http://schemas.microsoft.com/office/powerpoint/2010/main" val="639340913"/>
+      </p:ext>
+    </p:extLst>
+  </p:cSld>
+  <p:clrMapOvr>
+    <a:masterClrMapping/>
+  </p:clrMapOvr>
+</p:notes>
+</file>
+
+<file path=ppt/notesSlides/notesSlide4.xml><?xml version="1.0" encoding="utf-8"?>
+<p:notes xmlns:a="http://schemas.openxmlformats.org/drawingml/2006/main" xmlns:r="http://schemas.openxmlformats.org/officeDocument/2006/relationships" xmlns:p="http://schemas.openxmlformats.org/presentationml/2006/main">
+  <p:cSld>
+    <p:spTree>
+      <p:nvGrpSpPr>
+        <p:cNvPr id="1" name=""/>
+        <p:cNvGrpSpPr/>
+        <p:nvPr/>
+      </p:nvGrpSpPr>
+      <p:grpSpPr>
+        <a:xfrm>
+          <a:off x="0" y="0"/>
+          <a:ext cx="0" cy="0"/>
+          <a:chOff x="0" y="0"/>
+          <a:chExt cx="0" cy="0"/>
+        </a:xfrm>
+      </p:grpSpPr>
+      <p:sp>
+        <p:nvSpPr>
+          <p:cNvPr id="2" name="Slide Image Placeholder 1"/>
+          <p:cNvSpPr>
+            <a:spLocks noGrp="1" noRot="1" noChangeAspect="1"/>
+          </p:cNvSpPr>
+          <p:nvPr>
+            <p:ph type="sldImg"/>
+          </p:nvPr>
+        </p:nvSpPr>
+        <p:spPr/>
+      </p:sp>
+      <p:sp>
+        <p:nvSpPr>
+          <p:cNvPr id="3" name="Notes Placeholder 2"/>
+          <p:cNvSpPr>
+            <a:spLocks noGrp="1"/>
+          </p:cNvSpPr>
+          <p:nvPr>
+            <p:ph type="body" idx="1"/>
+          </p:nvPr>
+        </p:nvSpPr>
+        <p:spPr/>
+        <p:txBody>
+          <a:bodyPr/>
+          <a:lstStyle/>
+          <a:p>
             <a:r>
               <a:rPr lang="en-US" dirty="0"/>
               <a:t>Singleton is the pattern that ensures a class only has one instance and provides an access point to that instance</a:t>
@@ -876,7 +960,7 @@
           <a:p>
             <a:r>
               <a:rPr lang="en-US" dirty="0"/>
-              <a:t>singleton refers to the instance itself of that class.</a:t>
+              <a:t>singleton refers to a single-instance abstraction.</a:t>
             </a:r>
           </a:p>
           <a:p>
@@ -899,15 +983,7 @@
           <a:p>
             <a:r>
               <a:rPr lang="en-US" dirty="0"/>
-              <a:t>The order where static variable are initialized is </a:t>
-            </a:r>
-            <a:r>
-              <a:rPr lang="en-US"/>
-              <a:t>not set, so </a:t>
-            </a:r>
-            <a:r>
-              <a:rPr lang="en-US" dirty="0"/>
-              <a:t>when one static variable is dependent on another static variable, it can cause unpredictable </a:t>
+              <a:t>The order where static variable are initialized is not set, so when one static variable is dependent on another static variable, it can cause unpredictable </a:t>
             </a:r>
             <a:r>
               <a:rPr lang="en-US" dirty="0" err="1"/>
@@ -4215,7 +4291,7 @@
           <a:p>
             <a:r>
               <a:rPr lang="en-US" dirty="0"/>
-              <a:t>Summary</a:t>
+              <a:t>Conclusion</a:t>
             </a:r>
             <a:endParaRPr lang="nl-BE" dirty="0"/>
           </a:p>
@@ -4252,13 +4328,13 @@
           <a:p>
             <a:r>
               <a:rPr lang="en-US" dirty="0"/>
+              <a:t>Not all global data is bad, only when it’s mutable</a:t>
+            </a:r>
+          </a:p>
+          <a:p>
+            <a:r>
+              <a:rPr lang="en-US" dirty="0"/>
               <a:t>Prefer using a namespace over a class to model this type of abstraction.</a:t>
-            </a:r>
-          </a:p>
-          <a:p>
-            <a:r>
-              <a:rPr lang="en-US" dirty="0"/>
-              <a:t>Use static data carefully when implementing a singleton.</a:t>
             </a:r>
           </a:p>
         </p:txBody>
@@ -4316,7 +4392,7 @@
           <a:p>
             <a:r>
               <a:rPr lang="en-US" dirty="0"/>
-              <a:t>Summary [155 &lt; 160char]</a:t>
+              <a:t>Summary [154 &lt; 160char]</a:t>
             </a:r>
             <a:endParaRPr lang="nl-BE" dirty="0"/>
           </a:p>
@@ -4356,7 +4432,7 @@
             </a:pPr>
             <a:r>
               <a:rPr lang="en-US" sz="3200" dirty="0"/>
-              <a:t>“”</a:t>
+              <a:t>“Avoid the Singleton pattern. Put single-instance abstractions in a namespace. Pay attention when working with global memory, prevent circular dependencies”</a:t>
             </a:r>
             <a:endParaRPr lang="nl-BE" sz="3200" dirty="0"/>
           </a:p>
@@ -5341,6 +5417,16 @@
           <a:prstGeom prst="rect">
             <a:avLst/>
           </a:prstGeom>
+          <a:ln>
+            <a:noFill/>
+          </a:ln>
+          <a:effectLst>
+            <a:outerShdw blurRad="292100" dist="139700" dir="2700000" algn="tl" rotWithShape="0">
+              <a:srgbClr val="333333">
+                <a:alpha val="65000"/>
+              </a:srgbClr>
+            </a:outerShdw>
+          </a:effectLst>
         </p:spPr>
       </p:pic>
     </p:spTree>
@@ -5493,7 +5579,7 @@
           <p:nvPr/>
         </p:nvPicPr>
         <p:blipFill>
-          <a:blip r:embed="rId2"/>
+          <a:blip r:embed="rId3"/>
           <a:stretch>
             <a:fillRect/>
           </a:stretch>
@@ -5506,6 +5592,16 @@
           <a:prstGeom prst="rect">
             <a:avLst/>
           </a:prstGeom>
+          <a:ln>
+            <a:noFill/>
+          </a:ln>
+          <a:effectLst>
+            <a:outerShdw blurRad="292100" dist="139700" dir="2700000" algn="tl" rotWithShape="0">
+              <a:srgbClr val="333333">
+                <a:alpha val="65000"/>
+              </a:srgbClr>
+            </a:outerShdw>
+          </a:effectLst>
         </p:spPr>
       </p:pic>
       <p:pic>
@@ -5523,7 +5619,7 @@
           <p:nvPr/>
         </p:nvPicPr>
         <p:blipFill>
-          <a:blip r:embed="rId3"/>
+          <a:blip r:embed="rId4"/>
           <a:stretch>
             <a:fillRect/>
           </a:stretch>
@@ -5536,6 +5632,16 @@
           <a:prstGeom prst="rect">
             <a:avLst/>
           </a:prstGeom>
+          <a:ln>
+            <a:noFill/>
+          </a:ln>
+          <a:effectLst>
+            <a:outerShdw blurRad="292100" dist="139700" dir="2700000" algn="tl" rotWithShape="0">
+              <a:srgbClr val="333333">
+                <a:alpha val="65000"/>
+              </a:srgbClr>
+            </a:outerShdw>
+          </a:effectLst>
         </p:spPr>
       </p:pic>
     </p:spTree>
@@ -5633,8 +5739,25 @@
           <a:p>
             <a:r>
               <a:rPr lang="en-US" dirty="0"/>
-              <a:t>Not the single-instance abstraction</a:t>
-            </a:r>
+              <a:t>Not single-instance abstractions</a:t>
+            </a:r>
+          </a:p>
+          <a:p>
+            <a:r>
+              <a:rPr lang="en-US" dirty="0"/>
+              <a:t>Not all static memory falls under “Singleton”</a:t>
+            </a:r>
+          </a:p>
+          <a:p>
+            <a:r>
+              <a:rPr lang="en-US" dirty="0"/>
+              <a:t>Const global memory is fine (preferred </a:t>
+            </a:r>
+            <a:r>
+              <a:rPr lang="en-US"/>
+              <a:t>in namespace)</a:t>
+            </a:r>
+            <a:endParaRPr lang="en-US" dirty="0"/>
           </a:p>
           <a:p>
             <a:endParaRPr lang="en-US" dirty="0"/>
@@ -6438,30 +6561,6 @@
 </file>
 
 <file path=customXml/item1.xml><?xml version="1.0" encoding="utf-8"?>
-<p:properties xmlns:p="http://schemas.microsoft.com/office/2006/metadata/properties" xmlns:xsi="http://www.w3.org/2001/XMLSchema-instance" xmlns:pc="http://schemas.microsoft.com/office/infopath/2007/PartnerControls">
-  <documentManagement>
-    <lcf76f155ced4ddcb4097134ff3c332f xmlns="60eb0cf4-ae2a-4762-800a-cb593b869ecb">
-      <Terms xmlns="http://schemas.microsoft.com/office/infopath/2007/PartnerControls"/>
-    </lcf76f155ced4ddcb4097134ff3c332f>
-    <IconOverlay xmlns="http://schemas.microsoft.com/sharepoint/v4" xsi:nil="true"/>
-    <TaxCatchAll xmlns="128482ec-0431-40d5-ab26-89ea2a4f3ccd" xsi:nil="true"/>
-    <m99485b88215436a82099f8287cba0b0 xmlns="128482ec-0431-40d5-ab26-89ea2a4f3ccd">
-      <Terms xmlns="http://schemas.microsoft.com/office/infopath/2007/PartnerControls"/>
-    </m99485b88215436a82099f8287cba0b0>
-  </documentManagement>
-</p:properties>
-</file>
-
-<file path=customXml/item2.xml><?xml version="1.0" encoding="utf-8"?>
-<?mso-contentType ?>
-<FormTemplates xmlns="http://schemas.microsoft.com/sharepoint/v3/contenttype/forms">
-  <Display>DocumentLibraryForm</Display>
-  <Edit>DocumentLibraryForm</Edit>
-  <New>DocumentLibraryForm</New>
-</FormTemplates>
-</file>
-
-<file path=customXml/item3.xml><?xml version="1.0" encoding="utf-8"?>
 <ct:contentTypeSchema xmlns:ct="http://schemas.microsoft.com/office/2006/metadata/contentType" xmlns:ma="http://schemas.microsoft.com/office/2006/metadata/properties/metaAttributes" ct:_="" ma:_="" ma:contentTypeName="Document" ma:contentTypeID="0x010100723942CCEB3A674D8F1F6472CCEFB38E" ma:contentTypeVersion="12" ma:contentTypeDescription="Create a new document." ma:contentTypeScope="" ma:versionID="f7d503e4e5f2150aa73d4fab685f27ad">
   <xsd:schema xmlns:xsd="http://www.w3.org/2001/XMLSchema" xmlns:xs="http://www.w3.org/2001/XMLSchema" xmlns:p="http://schemas.microsoft.com/office/2006/metadata/properties" xmlns:ns2="128482ec-0431-40d5-ab26-89ea2a4f3ccd" xmlns:ns3="60eb0cf4-ae2a-4762-800a-cb593b869ecb" xmlns:ns4="http://schemas.microsoft.com/sharepoint/v4" xmlns:ns5="a2e691a9-fcfc-4d85-a390-1894fe98bd9e" targetNamespace="http://schemas.microsoft.com/office/2006/metadata/properties" ma:root="true" ma:fieldsID="cdaef380ec0413f963fceb43e408d365" ns2:_="" ns3:_="" ns4:_="" ns5:_="">
     <xsd:import namespace="128482ec-0431-40d5-ab26-89ea2a4f3ccd"/>
@@ -6740,27 +6839,31 @@
 </ct:contentTypeSchema>
 </file>
 
-<file path=customXml/itemProps1.xml><?xml version="1.0" encoding="utf-8"?>
-<ds:datastoreItem xmlns:ds="http://schemas.openxmlformats.org/officeDocument/2006/customXml" ds:itemID="{59359FEE-EE2A-4F2D-A45F-DFDF5ED95444}">
-  <ds:schemaRefs>
-    <ds:schemaRef ds:uri="http://schemas.microsoft.com/office/2006/metadata/properties"/>
-    <ds:schemaRef ds:uri="http://schemas.microsoft.com/office/infopath/2007/PartnerControls"/>
-    <ds:schemaRef ds:uri="60eb0cf4-ae2a-4762-800a-cb593b869ecb"/>
-    <ds:schemaRef ds:uri="http://schemas.microsoft.com/sharepoint/v4"/>
-    <ds:schemaRef ds:uri="128482ec-0431-40d5-ab26-89ea2a4f3ccd"/>
-  </ds:schemaRefs>
-</ds:datastoreItem>
+<file path=customXml/item2.xml><?xml version="1.0" encoding="utf-8"?>
+<?mso-contentType ?>
+<FormTemplates xmlns="http://schemas.microsoft.com/sharepoint/v3/contenttype/forms">
+  <Display>DocumentLibraryForm</Display>
+  <Edit>DocumentLibraryForm</Edit>
+  <New>DocumentLibraryForm</New>
+</FormTemplates>
 </file>
 
-<file path=customXml/itemProps2.xml><?xml version="1.0" encoding="utf-8"?>
-<ds:datastoreItem xmlns:ds="http://schemas.openxmlformats.org/officeDocument/2006/customXml" ds:itemID="{2D249758-9633-43E2-B21C-3D93EE8C5DA1}">
-  <ds:schemaRefs>
-    <ds:schemaRef ds:uri="http://schemas.microsoft.com/sharepoint/v3/contenttype/forms"/>
-  </ds:schemaRefs>
-</ds:datastoreItem>
+<file path=customXml/item3.xml><?xml version="1.0" encoding="utf-8"?>
+<p:properties xmlns:p="http://schemas.microsoft.com/office/2006/metadata/properties" xmlns:xsi="http://www.w3.org/2001/XMLSchema-instance" xmlns:pc="http://schemas.microsoft.com/office/infopath/2007/PartnerControls">
+  <documentManagement>
+    <lcf76f155ced4ddcb4097134ff3c332f xmlns="60eb0cf4-ae2a-4762-800a-cb593b869ecb">
+      <Terms xmlns="http://schemas.microsoft.com/office/infopath/2007/PartnerControls"/>
+    </lcf76f155ced4ddcb4097134ff3c332f>
+    <IconOverlay xmlns="http://schemas.microsoft.com/sharepoint/v4" xsi:nil="true"/>
+    <TaxCatchAll xmlns="128482ec-0431-40d5-ab26-89ea2a4f3ccd" xsi:nil="true"/>
+    <m99485b88215436a82099f8287cba0b0 xmlns="128482ec-0431-40d5-ab26-89ea2a4f3ccd">
+      <Terms xmlns="http://schemas.microsoft.com/office/infopath/2007/PartnerControls"/>
+    </m99485b88215436a82099f8287cba0b0>
+  </documentManagement>
+</p:properties>
 </file>
 
-<file path=customXml/itemProps3.xml><?xml version="1.0" encoding="utf-8"?>
+<file path=customXml/itemProps1.xml><?xml version="1.0" encoding="utf-8"?>
 <ds:datastoreItem xmlns:ds="http://schemas.openxmlformats.org/officeDocument/2006/customXml" ds:itemID="{EDF218E0-BDAF-4F27-A5F6-FDBA0507EB21}">
   <ds:schemaRefs>
     <ds:schemaRef ds:uri="http://schemas.microsoft.com/office/2006/metadata/contentType"/>
@@ -6779,4 +6882,24 @@
     <ds:schemaRef ds:uri="http://schemas.microsoft.com/internal/obd"/>
   </ds:schemaRefs>
 </ds:datastoreItem>
+</file>
+
+<file path=customXml/itemProps2.xml><?xml version="1.0" encoding="utf-8"?>
+<ds:datastoreItem xmlns:ds="http://schemas.openxmlformats.org/officeDocument/2006/customXml" ds:itemID="{2D249758-9633-43E2-B21C-3D93EE8C5DA1}">
+  <ds:schemaRefs>
+    <ds:schemaRef ds:uri="http://schemas.microsoft.com/sharepoint/v3/contenttype/forms"/>
+  </ds:schemaRefs>
+</ds:datastoreItem>
+</file>
+
+<file path=customXml/itemProps3.xml><?xml version="1.0" encoding="utf-8"?>
+<ds:datastoreItem xmlns:ds="http://schemas.openxmlformats.org/officeDocument/2006/customXml" ds:itemID="{59359FEE-EE2A-4F2D-A45F-DFDF5ED95444}">
+  <ds:schemaRefs>
+    <ds:schemaRef ds:uri="http://schemas.microsoft.com/office/2006/metadata/properties"/>
+    <ds:schemaRef ds:uri="http://schemas.microsoft.com/office/infopath/2007/PartnerControls"/>
+    <ds:schemaRef ds:uri="60eb0cf4-ae2a-4762-800a-cb593b869ecb"/>
+    <ds:schemaRef ds:uri="http://schemas.microsoft.com/sharepoint/v4"/>
+    <ds:schemaRef ds:uri="128482ec-0431-40d5-ab26-89ea2a4f3ccd"/>
+  </ds:schemaRefs>
+</ds:datastoreItem>
 </file>
</xml_diff>

<commit_message>
Feat/Added 2 more questions
</commit_message>
<xml_diff>
--- a/Beautiful C++ ch3-2 I.3.pptx
+++ b/Beautiful C++ ch3-2 I.3.pptx
@@ -952,6 +952,90 @@
           <a:bodyPr/>
           <a:lstStyle/>
           <a:p>
+            <a:endParaRPr lang="en-BE" dirty="0"/>
+          </a:p>
+        </p:txBody>
+      </p:sp>
+      <p:sp>
+        <p:nvSpPr>
+          <p:cNvPr id="4" name="Slide Number Placeholder 3"/>
+          <p:cNvSpPr>
+            <a:spLocks noGrp="1"/>
+          </p:cNvSpPr>
+          <p:nvPr>
+            <p:ph type="sldNum" sz="quarter" idx="5"/>
+          </p:nvPr>
+        </p:nvSpPr>
+        <p:spPr/>
+        <p:txBody>
+          <a:bodyPr/>
+          <a:lstStyle/>
+          <a:p>
+            <a:fld id="{5EE2CF44-2B13-41B4-A334-1CDF534EEBBF}" type="slidenum">
+              <a:rPr lang="en-BE" smtClean="0"/>
+              <a:t>9</a:t>
+            </a:fld>
+            <a:endParaRPr lang="en-BE"/>
+          </a:p>
+        </p:txBody>
+      </p:sp>
+    </p:spTree>
+    <p:extLst>
+      <p:ext uri="{BB962C8B-B14F-4D97-AF65-F5344CB8AC3E}">
+        <p14:creationId xmlns:p14="http://schemas.microsoft.com/office/powerpoint/2010/main" val="2494251490"/>
+      </p:ext>
+    </p:extLst>
+  </p:cSld>
+  <p:clrMapOvr>
+    <a:masterClrMapping/>
+  </p:clrMapOvr>
+</p:notes>
+</file>
+
+<file path=ppt/notesSlides/notesSlide5.xml><?xml version="1.0" encoding="utf-8"?>
+<p:notes xmlns:a="http://schemas.openxmlformats.org/drawingml/2006/main" xmlns:r="http://schemas.openxmlformats.org/officeDocument/2006/relationships" xmlns:p="http://schemas.openxmlformats.org/presentationml/2006/main">
+  <p:cSld>
+    <p:spTree>
+      <p:nvGrpSpPr>
+        <p:cNvPr id="1" name=""/>
+        <p:cNvGrpSpPr/>
+        <p:nvPr/>
+      </p:nvGrpSpPr>
+      <p:grpSpPr>
+        <a:xfrm>
+          <a:off x="0" y="0"/>
+          <a:ext cx="0" cy="0"/>
+          <a:chOff x="0" y="0"/>
+          <a:chExt cx="0" cy="0"/>
+        </a:xfrm>
+      </p:grpSpPr>
+      <p:sp>
+        <p:nvSpPr>
+          <p:cNvPr id="2" name="Slide Image Placeholder 1"/>
+          <p:cNvSpPr>
+            <a:spLocks noGrp="1" noRot="1" noChangeAspect="1"/>
+          </p:cNvSpPr>
+          <p:nvPr>
+            <p:ph type="sldImg"/>
+          </p:nvPr>
+        </p:nvSpPr>
+        <p:spPr/>
+      </p:sp>
+      <p:sp>
+        <p:nvSpPr>
+          <p:cNvPr id="3" name="Notes Placeholder 2"/>
+          <p:cNvSpPr>
+            <a:spLocks noGrp="1"/>
+          </p:cNvSpPr>
+          <p:nvPr>
+            <p:ph type="body" idx="1"/>
+          </p:nvPr>
+        </p:nvSpPr>
+        <p:spPr/>
+        <p:txBody>
+          <a:bodyPr/>
+          <a:lstStyle/>
+          <a:p>
             <a:r>
               <a:rPr lang="en-US" dirty="0"/>
               <a:t>Singleton is the pattern that ensures a class only has one instance and provides an access point to that instance</a:t>
@@ -983,15 +1067,31 @@
           <a:p>
             <a:r>
               <a:rPr lang="en-US" dirty="0"/>
-              <a:t>The order where static variable are initialized is not set, so when one static variable is dependent on another static variable, it can cause unpredictable </a:t>
-            </a:r>
-            <a:r>
-              <a:rPr lang="en-US" dirty="0" err="1"/>
-              <a:t>behaviour</a:t>
-            </a:r>
-            <a:r>
-              <a:rPr lang="en-US" dirty="0"/>
-              <a:t>, bugs and even crashes.</a:t>
+              <a:t>The order where static variable are initialized is not set, so when one static variables are dependent on each other, it can cause undefined behavior and even crashes.</a:t>
+            </a:r>
+          </a:p>
+          <a:p>
+            <a:endParaRPr lang="en-US" dirty="0"/>
+          </a:p>
+          <a:p>
+            <a:r>
+              <a:rPr lang="en-US" dirty="0"/>
+              <a:t>No, only global mutable memory is bad. Constant data can be safely declared globally, preferably in a namespace</a:t>
+            </a:r>
+          </a:p>
+          <a:p>
+            <a:endParaRPr lang="en-US" dirty="0"/>
+          </a:p>
+          <a:p>
+            <a:r>
+              <a:rPr lang="en-US" dirty="0"/>
+              <a:t>Setting the order of declaration for global memory would require all Linkers to accommodate for this feature. </a:t>
+            </a:r>
+          </a:p>
+          <a:p>
+            <a:r>
+              <a:rPr lang="en-US" dirty="0"/>
+              <a:t>It is also not bulletproof cause you can still cause circular dependencies with this system.</a:t>
             </a:r>
           </a:p>
           <a:p>
@@ -4522,7 +4622,7 @@
           <a:p>
             <a:r>
               <a:rPr lang="en-US" dirty="0"/>
-              <a:t>What is the difference between Singleton and singleton?</a:t>
+              <a:t>What is the difference between Singleton and a singleton?</a:t>
             </a:r>
           </a:p>
           <a:p>
@@ -4532,7 +4632,16 @@
             </a:r>
           </a:p>
           <a:p>
-            <a:endParaRPr lang="en-US" dirty="0"/>
+            <a:r>
+              <a:rPr lang="en-US" dirty="0"/>
+              <a:t>Is global memory always bad? Why?</a:t>
+            </a:r>
+          </a:p>
+          <a:p>
+            <a:r>
+              <a:rPr lang="en-US" dirty="0"/>
+              <a:t>Why isn’t dictating the order of construction for global variables standardized?</a:t>
+            </a:r>
           </a:p>
           <a:p>
             <a:endParaRPr lang="en-US" dirty="0"/>
@@ -5727,7 +5836,7 @@
           <a:p>
             <a:r>
               <a:rPr lang="en-US" dirty="0"/>
-              <a:t>It is</a:t>
+              <a:t>Well, it is, but that’s not a bad thing</a:t>
             </a:r>
           </a:p>
           <a:p>
@@ -5739,7 +5848,7 @@
           <a:p>
             <a:r>
               <a:rPr lang="en-US" dirty="0"/>
-              <a:t>Not single-instance abstractions</a:t>
+              <a:t>We still allow single-instance abstractions</a:t>
             </a:r>
           </a:p>
           <a:p>
@@ -5751,19 +5860,54 @@
           <a:p>
             <a:r>
               <a:rPr lang="en-US" dirty="0"/>
-              <a:t>Const global memory is fine (preferred </a:t>
-            </a:r>
-            <a:r>
-              <a:rPr lang="en-US"/>
-              <a:t>in namespace)</a:t>
-            </a:r>
+              <a:t>Const global memory is fine (preferred in namespace)</a:t>
+            </a:r>
+          </a:p>
+          <a:p>
             <a:endParaRPr lang="en-US" dirty="0"/>
           </a:p>
-          <a:p>
-            <a:endParaRPr lang="en-US" dirty="0"/>
-          </a:p>
-        </p:txBody>
-      </p:sp>
+        </p:txBody>
+      </p:sp>
+      <p:pic>
+        <p:nvPicPr>
+          <p:cNvPr id="9" name="Picture 8">
+            <a:extLst>
+              <a:ext uri="{FF2B5EF4-FFF2-40B4-BE49-F238E27FC236}">
+                <a16:creationId xmlns:a16="http://schemas.microsoft.com/office/drawing/2014/main" id="{6D53B067-85FF-A611-020F-2BE2B4E9D455}"/>
+              </a:ext>
+            </a:extLst>
+          </p:cNvPr>
+          <p:cNvPicPr>
+            <a:picLocks noChangeAspect="1"/>
+          </p:cNvPicPr>
+          <p:nvPr/>
+        </p:nvPicPr>
+        <p:blipFill>
+          <a:blip r:embed="rId3"/>
+          <a:stretch>
+            <a:fillRect/>
+          </a:stretch>
+        </p:blipFill>
+        <p:spPr>
+          <a:xfrm>
+            <a:off x="3747760" y="4869160"/>
+            <a:ext cx="4696480" cy="1105054"/>
+          </a:xfrm>
+          <a:prstGeom prst="rect">
+            <a:avLst/>
+          </a:prstGeom>
+          <a:ln>
+            <a:noFill/>
+          </a:ln>
+          <a:effectLst>
+            <a:outerShdw blurRad="292100" dist="139700" dir="2700000" algn="tl" rotWithShape="0">
+              <a:srgbClr val="333333">
+                <a:alpha val="65000"/>
+              </a:srgbClr>
+            </a:outerShdw>
+          </a:effectLst>
+        </p:spPr>
+      </p:pic>
     </p:spTree>
     <p:extLst>
       <p:ext uri="{BB962C8B-B14F-4D97-AF65-F5344CB8AC3E}">
@@ -6561,6 +6705,30 @@
 </file>
 
 <file path=customXml/item1.xml><?xml version="1.0" encoding="utf-8"?>
+<p:properties xmlns:p="http://schemas.microsoft.com/office/2006/metadata/properties" xmlns:xsi="http://www.w3.org/2001/XMLSchema-instance" xmlns:pc="http://schemas.microsoft.com/office/infopath/2007/PartnerControls">
+  <documentManagement>
+    <lcf76f155ced4ddcb4097134ff3c332f xmlns="60eb0cf4-ae2a-4762-800a-cb593b869ecb">
+      <Terms xmlns="http://schemas.microsoft.com/office/infopath/2007/PartnerControls"/>
+    </lcf76f155ced4ddcb4097134ff3c332f>
+    <IconOverlay xmlns="http://schemas.microsoft.com/sharepoint/v4" xsi:nil="true"/>
+    <TaxCatchAll xmlns="128482ec-0431-40d5-ab26-89ea2a4f3ccd" xsi:nil="true"/>
+    <m99485b88215436a82099f8287cba0b0 xmlns="128482ec-0431-40d5-ab26-89ea2a4f3ccd">
+      <Terms xmlns="http://schemas.microsoft.com/office/infopath/2007/PartnerControls"/>
+    </m99485b88215436a82099f8287cba0b0>
+  </documentManagement>
+</p:properties>
+</file>
+
+<file path=customXml/item2.xml><?xml version="1.0" encoding="utf-8"?>
+<?mso-contentType ?>
+<FormTemplates xmlns="http://schemas.microsoft.com/sharepoint/v3/contenttype/forms">
+  <Display>DocumentLibraryForm</Display>
+  <Edit>DocumentLibraryForm</Edit>
+  <New>DocumentLibraryForm</New>
+</FormTemplates>
+</file>
+
+<file path=customXml/item3.xml><?xml version="1.0" encoding="utf-8"?>
 <ct:contentTypeSchema xmlns:ct="http://schemas.microsoft.com/office/2006/metadata/contentType" xmlns:ma="http://schemas.microsoft.com/office/2006/metadata/properties/metaAttributes" ct:_="" ma:_="" ma:contentTypeName="Document" ma:contentTypeID="0x010100723942CCEB3A674D8F1F6472CCEFB38E" ma:contentTypeVersion="12" ma:contentTypeDescription="Create a new document." ma:contentTypeScope="" ma:versionID="f7d503e4e5f2150aa73d4fab685f27ad">
   <xsd:schema xmlns:xsd="http://www.w3.org/2001/XMLSchema" xmlns:xs="http://www.w3.org/2001/XMLSchema" xmlns:p="http://schemas.microsoft.com/office/2006/metadata/properties" xmlns:ns2="128482ec-0431-40d5-ab26-89ea2a4f3ccd" xmlns:ns3="60eb0cf4-ae2a-4762-800a-cb593b869ecb" xmlns:ns4="http://schemas.microsoft.com/sharepoint/v4" xmlns:ns5="a2e691a9-fcfc-4d85-a390-1894fe98bd9e" targetNamespace="http://schemas.microsoft.com/office/2006/metadata/properties" ma:root="true" ma:fieldsID="cdaef380ec0413f963fceb43e408d365" ns2:_="" ns3:_="" ns4:_="" ns5:_="">
     <xsd:import namespace="128482ec-0431-40d5-ab26-89ea2a4f3ccd"/>
@@ -6839,31 +7007,27 @@
 </ct:contentTypeSchema>
 </file>
 
-<file path=customXml/item2.xml><?xml version="1.0" encoding="utf-8"?>
-<?mso-contentType ?>
-<FormTemplates xmlns="http://schemas.microsoft.com/sharepoint/v3/contenttype/forms">
-  <Display>DocumentLibraryForm</Display>
-  <Edit>DocumentLibraryForm</Edit>
-  <New>DocumentLibraryForm</New>
-</FormTemplates>
+<file path=customXml/itemProps1.xml><?xml version="1.0" encoding="utf-8"?>
+<ds:datastoreItem xmlns:ds="http://schemas.openxmlformats.org/officeDocument/2006/customXml" ds:itemID="{59359FEE-EE2A-4F2D-A45F-DFDF5ED95444}">
+  <ds:schemaRefs>
+    <ds:schemaRef ds:uri="http://schemas.microsoft.com/office/2006/metadata/properties"/>
+    <ds:schemaRef ds:uri="http://schemas.microsoft.com/office/infopath/2007/PartnerControls"/>
+    <ds:schemaRef ds:uri="60eb0cf4-ae2a-4762-800a-cb593b869ecb"/>
+    <ds:schemaRef ds:uri="http://schemas.microsoft.com/sharepoint/v4"/>
+    <ds:schemaRef ds:uri="128482ec-0431-40d5-ab26-89ea2a4f3ccd"/>
+  </ds:schemaRefs>
+</ds:datastoreItem>
 </file>
 
-<file path=customXml/item3.xml><?xml version="1.0" encoding="utf-8"?>
-<p:properties xmlns:p="http://schemas.microsoft.com/office/2006/metadata/properties" xmlns:xsi="http://www.w3.org/2001/XMLSchema-instance" xmlns:pc="http://schemas.microsoft.com/office/infopath/2007/PartnerControls">
-  <documentManagement>
-    <lcf76f155ced4ddcb4097134ff3c332f xmlns="60eb0cf4-ae2a-4762-800a-cb593b869ecb">
-      <Terms xmlns="http://schemas.microsoft.com/office/infopath/2007/PartnerControls"/>
-    </lcf76f155ced4ddcb4097134ff3c332f>
-    <IconOverlay xmlns="http://schemas.microsoft.com/sharepoint/v4" xsi:nil="true"/>
-    <TaxCatchAll xmlns="128482ec-0431-40d5-ab26-89ea2a4f3ccd" xsi:nil="true"/>
-    <m99485b88215436a82099f8287cba0b0 xmlns="128482ec-0431-40d5-ab26-89ea2a4f3ccd">
-      <Terms xmlns="http://schemas.microsoft.com/office/infopath/2007/PartnerControls"/>
-    </m99485b88215436a82099f8287cba0b0>
-  </documentManagement>
-</p:properties>
+<file path=customXml/itemProps2.xml><?xml version="1.0" encoding="utf-8"?>
+<ds:datastoreItem xmlns:ds="http://schemas.openxmlformats.org/officeDocument/2006/customXml" ds:itemID="{2D249758-9633-43E2-B21C-3D93EE8C5DA1}">
+  <ds:schemaRefs>
+    <ds:schemaRef ds:uri="http://schemas.microsoft.com/sharepoint/v3/contenttype/forms"/>
+  </ds:schemaRefs>
+</ds:datastoreItem>
 </file>
 
-<file path=customXml/itemProps1.xml><?xml version="1.0" encoding="utf-8"?>
+<file path=customXml/itemProps3.xml><?xml version="1.0" encoding="utf-8"?>
 <ds:datastoreItem xmlns:ds="http://schemas.openxmlformats.org/officeDocument/2006/customXml" ds:itemID="{EDF218E0-BDAF-4F27-A5F6-FDBA0507EB21}">
   <ds:schemaRefs>
     <ds:schemaRef ds:uri="http://schemas.microsoft.com/office/2006/metadata/contentType"/>
@@ -6882,24 +7046,4 @@
     <ds:schemaRef ds:uri="http://schemas.microsoft.com/internal/obd"/>
   </ds:schemaRefs>
 </ds:datastoreItem>
-</file>
-
-<file path=customXml/itemProps2.xml><?xml version="1.0" encoding="utf-8"?>
-<ds:datastoreItem xmlns:ds="http://schemas.openxmlformats.org/officeDocument/2006/customXml" ds:itemID="{2D249758-9633-43E2-B21C-3D93EE8C5DA1}">
-  <ds:schemaRefs>
-    <ds:schemaRef ds:uri="http://schemas.microsoft.com/sharepoint/v3/contenttype/forms"/>
-  </ds:schemaRefs>
-</ds:datastoreItem>
-</file>
-
-<file path=customXml/itemProps3.xml><?xml version="1.0" encoding="utf-8"?>
-<ds:datastoreItem xmlns:ds="http://schemas.openxmlformats.org/officeDocument/2006/customXml" ds:itemID="{59359FEE-EE2A-4F2D-A45F-DFDF5ED95444}">
-  <ds:schemaRefs>
-    <ds:schemaRef ds:uri="http://schemas.microsoft.com/office/2006/metadata/properties"/>
-    <ds:schemaRef ds:uri="http://schemas.microsoft.com/office/infopath/2007/PartnerControls"/>
-    <ds:schemaRef ds:uri="60eb0cf4-ae2a-4762-800a-cb593b869ecb"/>
-    <ds:schemaRef ds:uri="http://schemas.microsoft.com/sharepoint/v4"/>
-    <ds:schemaRef ds:uri="128482ec-0431-40d5-ab26-89ea2a4f3ccd"/>
-  </ds:schemaRefs>
-</ds:datastoreItem>
 </file>
</xml_diff>